<commit_message>
update sidecar pictures in main readme
</commit_message>
<xml_diff>
--- a/docs/image-sources/kar-figures.pptx
+++ b/docs/image-sources/kar-figures.pptx
@@ -198,7 +198,7 @@
           <a:p>
             <a:fld id="{DC65C951-F6DB-3040-8A26-A34F90C6DE08}" type="datetimeFigureOut">
               <a:rPr lang="en-US" smtClean="0"/>
-              <a:t>4/9/20</a:t>
+              <a:t>4/16/20</a:t>
             </a:fld>
             <a:endParaRPr lang="en-US"/>
           </a:p>
@@ -780,7 +780,7 @@
           <a:p>
             <a:fld id="{F924721D-9C5E-6B49-AC5B-655F66DDA7A3}" type="datetime1">
               <a:rPr lang="en-US" smtClean="0"/>
-              <a:t>4/9/20</a:t>
+              <a:t>4/16/20</a:t>
             </a:fld>
             <a:endParaRPr lang="en-US"/>
           </a:p>
@@ -978,7 +978,7 @@
           <a:p>
             <a:fld id="{410D5C4C-AC47-7642-B604-A05A66F14757}" type="datetime1">
               <a:rPr lang="en-US" smtClean="0"/>
-              <a:t>4/9/20</a:t>
+              <a:t>4/16/20</a:t>
             </a:fld>
             <a:endParaRPr lang="en-US"/>
           </a:p>
@@ -1186,7 +1186,7 @@
           <a:p>
             <a:fld id="{81BFAE4C-29D7-A84F-A4B9-15F332B42075}" type="datetime1">
               <a:rPr lang="en-US" smtClean="0"/>
-              <a:t>4/9/20</a:t>
+              <a:t>4/16/20</a:t>
             </a:fld>
             <a:endParaRPr lang="en-US"/>
           </a:p>
@@ -1384,7 +1384,7 @@
           <a:p>
             <a:fld id="{F32190BF-3CB9-4F4C-9755-39D6FE4B7A74}" type="datetime1">
               <a:rPr lang="en-US" smtClean="0"/>
-              <a:t>4/9/20</a:t>
+              <a:t>4/16/20</a:t>
             </a:fld>
             <a:endParaRPr lang="en-US"/>
           </a:p>
@@ -1659,7 +1659,7 @@
           <a:p>
             <a:fld id="{E19308FC-30CC-9741-A0ED-8F155680C791}" type="datetime1">
               <a:rPr lang="en-US" smtClean="0"/>
-              <a:t>4/9/20</a:t>
+              <a:t>4/16/20</a:t>
             </a:fld>
             <a:endParaRPr lang="en-US"/>
           </a:p>
@@ -1924,7 +1924,7 @@
           <a:p>
             <a:fld id="{6841A4A3-0324-C64F-9FE7-6903EC895BB9}" type="datetime1">
               <a:rPr lang="en-US" smtClean="0"/>
-              <a:t>4/9/20</a:t>
+              <a:t>4/16/20</a:t>
             </a:fld>
             <a:endParaRPr lang="en-US"/>
           </a:p>
@@ -2336,7 +2336,7 @@
           <a:p>
             <a:fld id="{1E90409D-4799-CD41-898D-FC6CC1258871}" type="datetime1">
               <a:rPr lang="en-US" smtClean="0"/>
-              <a:t>4/9/20</a:t>
+              <a:t>4/16/20</a:t>
             </a:fld>
             <a:endParaRPr lang="en-US"/>
           </a:p>
@@ -2477,7 +2477,7 @@
           <a:p>
             <a:fld id="{34C43BAA-C11F-FD4E-8D10-9852881CF7D8}" type="datetime1">
               <a:rPr lang="en-US" smtClean="0"/>
-              <a:t>4/9/20</a:t>
+              <a:t>4/16/20</a:t>
             </a:fld>
             <a:endParaRPr lang="en-US"/>
           </a:p>
@@ -2590,7 +2590,7 @@
           <a:p>
             <a:fld id="{D997C73D-4315-D949-8336-F9609DECEE68}" type="datetime1">
               <a:rPr lang="en-US" smtClean="0"/>
-              <a:t>4/9/20</a:t>
+              <a:t>4/16/20</a:t>
             </a:fld>
             <a:endParaRPr lang="en-US"/>
           </a:p>
@@ -2901,7 +2901,7 @@
           <a:p>
             <a:fld id="{392654A9-410C-824C-82D8-C652E365CD9E}" type="datetime1">
               <a:rPr lang="en-US" smtClean="0"/>
-              <a:t>4/9/20</a:t>
+              <a:t>4/16/20</a:t>
             </a:fld>
             <a:endParaRPr lang="en-US"/>
           </a:p>
@@ -3189,7 +3189,7 @@
           <a:p>
             <a:fld id="{8A615C88-D66E-A94A-8D6A-02B32F892117}" type="datetime1">
               <a:rPr lang="en-US" smtClean="0"/>
-              <a:t>4/9/20</a:t>
+              <a:t>4/16/20</a:t>
             </a:fld>
             <a:endParaRPr lang="en-US"/>
           </a:p>
@@ -3430,7 +3430,7 @@
           <a:p>
             <a:fld id="{CD1EC2A6-1E91-8048-8D30-369F2C578845}" type="datetime1">
               <a:rPr lang="en-US" smtClean="0"/>
-              <a:t>4/9/20</a:t>
+              <a:t>4/16/20</a:t>
             </a:fld>
             <a:endParaRPr lang="en-US"/>
           </a:p>
@@ -3848,12 +3848,41 @@
           <a:chExt cx="0" cy="0"/>
         </a:xfrm>
       </p:grpSpPr>
+      <p:sp>
+        <p:nvSpPr>
+          <p:cNvPr id="11" name="Slide Number Placeholder 10">
+            <a:extLst>
+              <a:ext uri="{FF2B5EF4-FFF2-40B4-BE49-F238E27FC236}">
+                <a16:creationId xmlns:a16="http://schemas.microsoft.com/office/drawing/2014/main" id="{6D8DB929-A3D6-BE42-AABF-DE04CA8C986F}"/>
+              </a:ext>
+            </a:extLst>
+          </p:cNvPr>
+          <p:cNvSpPr>
+            <a:spLocks noGrp="1"/>
+          </p:cNvSpPr>
+          <p:nvPr>
+            <p:ph type="sldNum" sz="quarter" idx="12"/>
+          </p:nvPr>
+        </p:nvSpPr>
+        <p:spPr/>
+        <p:txBody>
+          <a:bodyPr/>
+          <a:lstStyle/>
+          <a:p>
+            <a:fld id="{FC517010-E647-2249-A958-B3027541DB25}" type="slidenum">
+              <a:rPr lang="en-US" smtClean="0"/>
+              <a:t>1</a:t>
+            </a:fld>
+            <a:endParaRPr lang="en-US"/>
+          </a:p>
+        </p:txBody>
+      </p:sp>
       <p:grpSp>
         <p:nvGrpSpPr>
-          <p:cNvPr id="48" name="Group 47">
-            <a:extLst>
-              <a:ext uri="{FF2B5EF4-FFF2-40B4-BE49-F238E27FC236}">
-                <a16:creationId xmlns:a16="http://schemas.microsoft.com/office/drawing/2014/main" id="{93BBD36D-361F-9640-9A84-6C175F7AE521}"/>
+          <p:cNvPr id="5" name="Group 4">
+            <a:extLst>
+              <a:ext uri="{FF2B5EF4-FFF2-40B4-BE49-F238E27FC236}">
+                <a16:creationId xmlns:a16="http://schemas.microsoft.com/office/drawing/2014/main" id="{0DE20333-5AC7-1542-9301-494CFDAFC83B}"/>
               </a:ext>
             </a:extLst>
           </p:cNvPr>
@@ -3862,7 +3891,1562 @@
         </p:nvGrpSpPr>
         <p:grpSpPr>
           <a:xfrm>
-            <a:off x="1693584" y="2728119"/>
+            <a:off x="5964621" y="2868403"/>
+            <a:ext cx="2086708" cy="1556504"/>
+            <a:chOff x="5964621" y="2868403"/>
+            <a:chExt cx="2086708" cy="1556504"/>
+          </a:xfrm>
+        </p:grpSpPr>
+        <p:sp>
+          <p:nvSpPr>
+            <p:cNvPr id="50" name="TextBox 49">
+              <a:extLst>
+                <a:ext uri="{FF2B5EF4-FFF2-40B4-BE49-F238E27FC236}">
+                  <a16:creationId xmlns:a16="http://schemas.microsoft.com/office/drawing/2014/main" id="{3DCCF9A3-AA0E-194C-AC93-432CFE41AFC9}"/>
+                </a:ext>
+              </a:extLst>
+            </p:cNvPr>
+            <p:cNvSpPr txBox="1"/>
+            <p:nvPr/>
+          </p:nvSpPr>
+          <p:spPr>
+            <a:xfrm>
+              <a:off x="5964622" y="4024797"/>
+              <a:ext cx="2086707" cy="400110"/>
+            </a:xfrm>
+            <a:prstGeom prst="rect">
+              <a:avLst/>
+            </a:prstGeom>
+            <a:solidFill>
+              <a:schemeClr val="accent6"/>
+            </a:solidFill>
+          </p:spPr>
+          <p:txBody>
+            <a:bodyPr wrap="square" rtlCol="0">
+              <a:spAutoFit/>
+            </a:bodyPr>
+            <a:lstStyle/>
+            <a:p>
+              <a:pPr algn="ctr"/>
+              <a:r>
+                <a:rPr lang="en-US" sz="2000" dirty="0">
+                  <a:solidFill>
+                    <a:schemeClr val="bg1"/>
+                  </a:solidFill>
+                </a:rPr>
+                <a:t>App Component</a:t>
+              </a:r>
+            </a:p>
+          </p:txBody>
+        </p:sp>
+        <p:sp>
+          <p:nvSpPr>
+            <p:cNvPr id="51" name="TextBox 50">
+              <a:extLst>
+                <a:ext uri="{FF2B5EF4-FFF2-40B4-BE49-F238E27FC236}">
+                  <a16:creationId xmlns:a16="http://schemas.microsoft.com/office/drawing/2014/main" id="{7013DF50-956D-C244-BAAC-E043039CF135}"/>
+                </a:ext>
+              </a:extLst>
+            </p:cNvPr>
+            <p:cNvSpPr txBox="1"/>
+            <p:nvPr/>
+          </p:nvSpPr>
+          <p:spPr>
+            <a:xfrm>
+              <a:off x="5964621" y="2868403"/>
+              <a:ext cx="2086707" cy="400110"/>
+            </a:xfrm>
+            <a:prstGeom prst="rect">
+              <a:avLst/>
+            </a:prstGeom>
+            <a:solidFill>
+              <a:srgbClr val="0070C0"/>
+            </a:solidFill>
+          </p:spPr>
+          <p:txBody>
+            <a:bodyPr wrap="square" rtlCol="0">
+              <a:spAutoFit/>
+            </a:bodyPr>
+            <a:lstStyle/>
+            <a:p>
+              <a:pPr algn="ctr"/>
+              <a:r>
+                <a:rPr lang="en-US" sz="2000" dirty="0">
+                  <a:solidFill>
+                    <a:schemeClr val="bg1"/>
+                  </a:solidFill>
+                </a:rPr>
+                <a:t>KAR sidecar</a:t>
+              </a:r>
+            </a:p>
+          </p:txBody>
+        </p:sp>
+        <p:cxnSp>
+          <p:nvCxnSpPr>
+            <p:cNvPr id="52" name="Straight Arrow Connector 51">
+              <a:extLst>
+                <a:ext uri="{FF2B5EF4-FFF2-40B4-BE49-F238E27FC236}">
+                  <a16:creationId xmlns:a16="http://schemas.microsoft.com/office/drawing/2014/main" id="{1ADC2670-884D-D24D-B16C-081AA05054A9}"/>
+                </a:ext>
+              </a:extLst>
+            </p:cNvPr>
+            <p:cNvCxnSpPr>
+              <a:cxnSpLocks/>
+              <a:stCxn id="51" idx="2"/>
+              <a:endCxn id="50" idx="0"/>
+            </p:cNvCxnSpPr>
+            <p:nvPr/>
+          </p:nvCxnSpPr>
+          <p:spPr>
+            <a:xfrm>
+              <a:off x="7007975" y="3268513"/>
+              <a:ext cx="1" cy="756284"/>
+            </a:xfrm>
+            <a:prstGeom prst="straightConnector1">
+              <a:avLst/>
+            </a:prstGeom>
+            <a:ln w="38100">
+              <a:headEnd type="triangle"/>
+              <a:tailEnd type="triangle"/>
+            </a:ln>
+          </p:spPr>
+          <p:style>
+            <a:lnRef idx="1">
+              <a:schemeClr val="accent1"/>
+            </a:lnRef>
+            <a:fillRef idx="0">
+              <a:schemeClr val="accent1"/>
+            </a:fillRef>
+            <a:effectRef idx="0">
+              <a:schemeClr val="accent1"/>
+            </a:effectRef>
+            <a:fontRef idx="minor">
+              <a:schemeClr val="tx1"/>
+            </a:fontRef>
+          </p:style>
+        </p:cxnSp>
+        <p:sp>
+          <p:nvSpPr>
+            <p:cNvPr id="53" name="TextBox 52">
+              <a:extLst>
+                <a:ext uri="{FF2B5EF4-FFF2-40B4-BE49-F238E27FC236}">
+                  <a16:creationId xmlns:a16="http://schemas.microsoft.com/office/drawing/2014/main" id="{0D06758F-3BDA-8C4E-8F31-E9EE9C084D19}"/>
+                </a:ext>
+              </a:extLst>
+            </p:cNvPr>
+            <p:cNvSpPr txBox="1"/>
+            <p:nvPr/>
+          </p:nvSpPr>
+          <p:spPr>
+            <a:xfrm>
+              <a:off x="7007974" y="3506022"/>
+              <a:ext cx="914400" cy="369332"/>
+            </a:xfrm>
+            <a:prstGeom prst="rect">
+              <a:avLst/>
+            </a:prstGeom>
+            <a:noFill/>
+          </p:spPr>
+          <p:txBody>
+            <a:bodyPr wrap="square" rtlCol="0">
+              <a:spAutoFit/>
+            </a:bodyPr>
+            <a:lstStyle/>
+            <a:p>
+              <a:r>
+                <a:rPr lang="en-US" dirty="0"/>
+                <a:t>http</a:t>
+              </a:r>
+            </a:p>
+          </p:txBody>
+        </p:sp>
+      </p:grpSp>
+      <p:sp>
+        <p:nvSpPr>
+          <p:cNvPr id="2" name="TextBox 1">
+            <a:extLst>
+              <a:ext uri="{FF2B5EF4-FFF2-40B4-BE49-F238E27FC236}">
+                <a16:creationId xmlns:a16="http://schemas.microsoft.com/office/drawing/2014/main" id="{B81F55F5-62D5-5840-AB21-2005E1694ADF}"/>
+              </a:ext>
+            </a:extLst>
+          </p:cNvPr>
+          <p:cNvSpPr txBox="1"/>
+          <p:nvPr/>
+        </p:nvSpPr>
+        <p:spPr>
+          <a:xfrm>
+            <a:off x="5729555" y="5233741"/>
+            <a:ext cx="2596055" cy="369332"/>
+          </a:xfrm>
+          <a:prstGeom prst="rect">
+            <a:avLst/>
+          </a:prstGeom>
+          <a:noFill/>
+        </p:spPr>
+        <p:txBody>
+          <a:bodyPr wrap="square" rtlCol="0">
+            <a:spAutoFit/>
+          </a:bodyPr>
+          <a:lstStyle/>
+          <a:p>
+            <a:r>
+              <a:rPr lang="en-US" dirty="0"/>
+              <a:t>Local mode (2 processes)</a:t>
+            </a:r>
+          </a:p>
+        </p:txBody>
+      </p:sp>
+      <p:grpSp>
+        <p:nvGrpSpPr>
+          <p:cNvPr id="9" name="Group 8">
+            <a:extLst>
+              <a:ext uri="{FF2B5EF4-FFF2-40B4-BE49-F238E27FC236}">
+                <a16:creationId xmlns:a16="http://schemas.microsoft.com/office/drawing/2014/main" id="{D04C0CD1-537A-D44F-A738-78DA53ECDF6C}"/>
+              </a:ext>
+            </a:extLst>
+          </p:cNvPr>
+          <p:cNvGrpSpPr/>
+          <p:nvPr/>
+        </p:nvGrpSpPr>
+        <p:grpSpPr>
+          <a:xfrm>
+            <a:off x="1762405" y="2382032"/>
+            <a:ext cx="2743196" cy="2590800"/>
+            <a:chOff x="2198080" y="3241702"/>
+            <a:chExt cx="2743196" cy="2590800"/>
+          </a:xfrm>
+        </p:grpSpPr>
+        <p:sp>
+          <p:nvSpPr>
+            <p:cNvPr id="10" name="Rectangle 9">
+              <a:extLst>
+                <a:ext uri="{FF2B5EF4-FFF2-40B4-BE49-F238E27FC236}">
+                  <a16:creationId xmlns:a16="http://schemas.microsoft.com/office/drawing/2014/main" id="{EDEA59C7-3471-AA49-94AB-EEAAF92D62F8}"/>
+                </a:ext>
+              </a:extLst>
+            </p:cNvPr>
+            <p:cNvSpPr/>
+            <p:nvPr/>
+          </p:nvSpPr>
+          <p:spPr>
+            <a:xfrm>
+              <a:off x="2198080" y="3241702"/>
+              <a:ext cx="2743196" cy="2590800"/>
+            </a:xfrm>
+            <a:prstGeom prst="rect">
+              <a:avLst/>
+            </a:prstGeom>
+            <a:solidFill>
+              <a:schemeClr val="accent2">
+                <a:lumMod val="40000"/>
+                <a:lumOff val="60000"/>
+              </a:schemeClr>
+            </a:solidFill>
+          </p:spPr>
+          <p:style>
+            <a:lnRef idx="2">
+              <a:schemeClr val="accent1">
+                <a:shade val="50000"/>
+              </a:schemeClr>
+            </a:lnRef>
+            <a:fillRef idx="1">
+              <a:schemeClr val="accent1"/>
+            </a:fillRef>
+            <a:effectRef idx="0">
+              <a:schemeClr val="accent1"/>
+            </a:effectRef>
+            <a:fontRef idx="minor">
+              <a:schemeClr val="lt1"/>
+            </a:fontRef>
+          </p:style>
+          <p:txBody>
+            <a:bodyPr rtlCol="0" anchor="ctr"/>
+            <a:lstStyle/>
+            <a:p>
+              <a:r>
+                <a:rPr lang="en-US" dirty="0">
+                  <a:solidFill>
+                    <a:schemeClr val="tx1"/>
+                  </a:solidFill>
+                </a:rPr>
+                <a:t>pod</a:t>
+              </a:r>
+            </a:p>
+            <a:p>
+              <a:pPr algn="ctr"/>
+              <a:endParaRPr lang="en-US" dirty="0">
+                <a:solidFill>
+                  <a:schemeClr val="tx1"/>
+                </a:solidFill>
+              </a:endParaRPr>
+            </a:p>
+            <a:p>
+              <a:pPr algn="ctr"/>
+              <a:endParaRPr lang="en-US" dirty="0">
+                <a:solidFill>
+                  <a:schemeClr val="tx1"/>
+                </a:solidFill>
+              </a:endParaRPr>
+            </a:p>
+            <a:p>
+              <a:pPr algn="ctr"/>
+              <a:endParaRPr lang="en-US" dirty="0">
+                <a:solidFill>
+                  <a:schemeClr val="tx1"/>
+                </a:solidFill>
+              </a:endParaRPr>
+            </a:p>
+            <a:p>
+              <a:pPr algn="ctr"/>
+              <a:endParaRPr lang="en-US" dirty="0">
+                <a:solidFill>
+                  <a:schemeClr val="tx1"/>
+                </a:solidFill>
+              </a:endParaRPr>
+            </a:p>
+            <a:p>
+              <a:pPr algn="ctr"/>
+              <a:endParaRPr lang="en-US" dirty="0">
+                <a:solidFill>
+                  <a:schemeClr val="tx1"/>
+                </a:solidFill>
+              </a:endParaRPr>
+            </a:p>
+            <a:p>
+              <a:pPr algn="ctr"/>
+              <a:endParaRPr lang="en-US" dirty="0">
+                <a:solidFill>
+                  <a:schemeClr val="tx1"/>
+                </a:solidFill>
+              </a:endParaRPr>
+            </a:p>
+            <a:p>
+              <a:pPr algn="ctr"/>
+              <a:endParaRPr lang="en-US" dirty="0">
+                <a:solidFill>
+                  <a:schemeClr val="tx1"/>
+                </a:solidFill>
+              </a:endParaRPr>
+            </a:p>
+            <a:p>
+              <a:pPr algn="ctr"/>
+              <a:endParaRPr lang="en-US" dirty="0">
+                <a:solidFill>
+                  <a:schemeClr val="tx1"/>
+                </a:solidFill>
+              </a:endParaRPr>
+            </a:p>
+          </p:txBody>
+        </p:sp>
+        <p:sp>
+          <p:nvSpPr>
+            <p:cNvPr id="12" name="TextBox 11">
+              <a:extLst>
+                <a:ext uri="{FF2B5EF4-FFF2-40B4-BE49-F238E27FC236}">
+                  <a16:creationId xmlns:a16="http://schemas.microsoft.com/office/drawing/2014/main" id="{32350EF1-693D-9B48-A7AB-2ECBE8F7AE1B}"/>
+                </a:ext>
+              </a:extLst>
+            </p:cNvPr>
+            <p:cNvSpPr txBox="1"/>
+            <p:nvPr/>
+          </p:nvSpPr>
+          <p:spPr>
+            <a:xfrm>
+              <a:off x="2526326" y="4884467"/>
+              <a:ext cx="2086707" cy="400110"/>
+            </a:xfrm>
+            <a:prstGeom prst="rect">
+              <a:avLst/>
+            </a:prstGeom>
+            <a:solidFill>
+              <a:schemeClr val="accent6"/>
+            </a:solidFill>
+          </p:spPr>
+          <p:txBody>
+            <a:bodyPr wrap="square" rtlCol="0">
+              <a:spAutoFit/>
+            </a:bodyPr>
+            <a:lstStyle/>
+            <a:p>
+              <a:pPr algn="ctr"/>
+              <a:r>
+                <a:rPr lang="en-US" sz="2000" dirty="0">
+                  <a:solidFill>
+                    <a:schemeClr val="bg1"/>
+                  </a:solidFill>
+                </a:rPr>
+                <a:t>App Component</a:t>
+              </a:r>
+            </a:p>
+          </p:txBody>
+        </p:sp>
+        <p:sp>
+          <p:nvSpPr>
+            <p:cNvPr id="13" name="TextBox 12">
+              <a:extLst>
+                <a:ext uri="{FF2B5EF4-FFF2-40B4-BE49-F238E27FC236}">
+                  <a16:creationId xmlns:a16="http://schemas.microsoft.com/office/drawing/2014/main" id="{8B8D47DE-1F1C-2245-B155-6EBA5143B970}"/>
+                </a:ext>
+              </a:extLst>
+            </p:cNvPr>
+            <p:cNvSpPr txBox="1"/>
+            <p:nvPr/>
+          </p:nvSpPr>
+          <p:spPr>
+            <a:xfrm>
+              <a:off x="2526325" y="3728073"/>
+              <a:ext cx="2086707" cy="400110"/>
+            </a:xfrm>
+            <a:prstGeom prst="rect">
+              <a:avLst/>
+            </a:prstGeom>
+            <a:solidFill>
+              <a:srgbClr val="0070C0"/>
+            </a:solidFill>
+          </p:spPr>
+          <p:txBody>
+            <a:bodyPr wrap="square" rtlCol="0">
+              <a:spAutoFit/>
+            </a:bodyPr>
+            <a:lstStyle/>
+            <a:p>
+              <a:pPr algn="ctr"/>
+              <a:r>
+                <a:rPr lang="en-US" sz="2000" dirty="0">
+                  <a:solidFill>
+                    <a:schemeClr val="bg1"/>
+                  </a:solidFill>
+                </a:rPr>
+                <a:t>KAR sidecar</a:t>
+              </a:r>
+            </a:p>
+          </p:txBody>
+        </p:sp>
+        <p:cxnSp>
+          <p:nvCxnSpPr>
+            <p:cNvPr id="14" name="Straight Arrow Connector 13">
+              <a:extLst>
+                <a:ext uri="{FF2B5EF4-FFF2-40B4-BE49-F238E27FC236}">
+                  <a16:creationId xmlns:a16="http://schemas.microsoft.com/office/drawing/2014/main" id="{AA67B137-7613-2A45-9C86-3C471902D166}"/>
+                </a:ext>
+              </a:extLst>
+            </p:cNvPr>
+            <p:cNvCxnSpPr>
+              <a:cxnSpLocks/>
+              <a:stCxn id="13" idx="2"/>
+              <a:endCxn id="12" idx="0"/>
+            </p:cNvCxnSpPr>
+            <p:nvPr/>
+          </p:nvCxnSpPr>
+          <p:spPr>
+            <a:xfrm>
+              <a:off x="3569679" y="4128183"/>
+              <a:ext cx="1" cy="756284"/>
+            </a:xfrm>
+            <a:prstGeom prst="straightConnector1">
+              <a:avLst/>
+            </a:prstGeom>
+            <a:ln w="38100">
+              <a:headEnd type="triangle"/>
+              <a:tailEnd type="triangle"/>
+            </a:ln>
+          </p:spPr>
+          <p:style>
+            <a:lnRef idx="1">
+              <a:schemeClr val="accent1"/>
+            </a:lnRef>
+            <a:fillRef idx="0">
+              <a:schemeClr val="accent1"/>
+            </a:fillRef>
+            <a:effectRef idx="0">
+              <a:schemeClr val="accent1"/>
+            </a:effectRef>
+            <a:fontRef idx="minor">
+              <a:schemeClr val="tx1"/>
+            </a:fontRef>
+          </p:style>
+        </p:cxnSp>
+        <p:sp>
+          <p:nvSpPr>
+            <p:cNvPr id="15" name="TextBox 14">
+              <a:extLst>
+                <a:ext uri="{FF2B5EF4-FFF2-40B4-BE49-F238E27FC236}">
+                  <a16:creationId xmlns:a16="http://schemas.microsoft.com/office/drawing/2014/main" id="{4F0BA465-546C-E94F-B57D-D6C9D6B9A1B4}"/>
+                </a:ext>
+              </a:extLst>
+            </p:cNvPr>
+            <p:cNvSpPr txBox="1"/>
+            <p:nvPr/>
+          </p:nvSpPr>
+          <p:spPr>
+            <a:xfrm>
+              <a:off x="3569678" y="4365692"/>
+              <a:ext cx="914400" cy="369332"/>
+            </a:xfrm>
+            <a:prstGeom prst="rect">
+              <a:avLst/>
+            </a:prstGeom>
+            <a:noFill/>
+          </p:spPr>
+          <p:txBody>
+            <a:bodyPr wrap="square" rtlCol="0">
+              <a:spAutoFit/>
+            </a:bodyPr>
+            <a:lstStyle/>
+            <a:p>
+              <a:r>
+                <a:rPr lang="en-US" dirty="0"/>
+                <a:t>http</a:t>
+              </a:r>
+            </a:p>
+          </p:txBody>
+        </p:sp>
+      </p:grpSp>
+      <p:sp>
+        <p:nvSpPr>
+          <p:cNvPr id="16" name="TextBox 15">
+            <a:extLst>
+              <a:ext uri="{FF2B5EF4-FFF2-40B4-BE49-F238E27FC236}">
+                <a16:creationId xmlns:a16="http://schemas.microsoft.com/office/drawing/2014/main" id="{A8764217-3815-DA4E-9476-48900460E87D}"/>
+              </a:ext>
+            </a:extLst>
+          </p:cNvPr>
+          <p:cNvSpPr txBox="1"/>
+          <p:nvPr/>
+        </p:nvSpPr>
+        <p:spPr>
+          <a:xfrm>
+            <a:off x="1257907" y="5211968"/>
+            <a:ext cx="4250016" cy="369332"/>
+          </a:xfrm>
+          <a:prstGeom prst="rect">
+            <a:avLst/>
+          </a:prstGeom>
+          <a:noFill/>
+        </p:spPr>
+        <p:txBody>
+          <a:bodyPr wrap="square" rtlCol="0">
+            <a:spAutoFit/>
+          </a:bodyPr>
+          <a:lstStyle/>
+          <a:p>
+            <a:r>
+              <a:rPr lang="en-US" dirty="0"/>
+              <a:t>Kubernetes mode (1 pod; 2 containers)</a:t>
+            </a:r>
+          </a:p>
+        </p:txBody>
+      </p:sp>
+    </p:spTree>
+    <p:extLst>
+      <p:ext uri="{BB962C8B-B14F-4D97-AF65-F5344CB8AC3E}">
+        <p14:creationId xmlns:p14="http://schemas.microsoft.com/office/powerpoint/2010/main" val="1264973388"/>
+      </p:ext>
+    </p:extLst>
+  </p:cSld>
+  <p:clrMapOvr>
+    <a:masterClrMapping/>
+  </p:clrMapOvr>
+</p:sld>
+</file>
+
+<file path=ppt/slides/slide2.xml><?xml version="1.0" encoding="utf-8"?>
+<p:sld xmlns:a="http://schemas.openxmlformats.org/drawingml/2006/main" xmlns:r="http://schemas.openxmlformats.org/officeDocument/2006/relationships" xmlns:p="http://schemas.openxmlformats.org/presentationml/2006/main">
+  <p:cSld>
+    <p:spTree>
+      <p:nvGrpSpPr>
+        <p:cNvPr id="1" name=""/>
+        <p:cNvGrpSpPr/>
+        <p:nvPr/>
+      </p:nvGrpSpPr>
+      <p:grpSpPr>
+        <a:xfrm>
+          <a:off x="0" y="0"/>
+          <a:ext cx="0" cy="0"/>
+          <a:chOff x="0" y="0"/>
+          <a:chExt cx="0" cy="0"/>
+        </a:xfrm>
+      </p:grpSpPr>
+      <p:grpSp>
+        <p:nvGrpSpPr>
+          <p:cNvPr id="3" name="Group 2">
+            <a:extLst>
+              <a:ext uri="{FF2B5EF4-FFF2-40B4-BE49-F238E27FC236}">
+                <a16:creationId xmlns:a16="http://schemas.microsoft.com/office/drawing/2014/main" id="{3F10BDA9-92A7-A243-BC5C-D58C392080CE}"/>
+              </a:ext>
+            </a:extLst>
+          </p:cNvPr>
+          <p:cNvGrpSpPr/>
+          <p:nvPr/>
+        </p:nvGrpSpPr>
+        <p:grpSpPr>
+          <a:xfrm>
+            <a:off x="2198080" y="2054036"/>
+            <a:ext cx="2743196" cy="2590800"/>
+            <a:chOff x="2198080" y="3241702"/>
+            <a:chExt cx="2743196" cy="2590800"/>
+          </a:xfrm>
+        </p:grpSpPr>
+        <p:sp>
+          <p:nvSpPr>
+            <p:cNvPr id="16" name="Rectangle 15">
+              <a:extLst>
+                <a:ext uri="{FF2B5EF4-FFF2-40B4-BE49-F238E27FC236}">
+                  <a16:creationId xmlns:a16="http://schemas.microsoft.com/office/drawing/2014/main" id="{43494236-B475-E34B-BBE0-A28246B3C579}"/>
+                </a:ext>
+              </a:extLst>
+            </p:cNvPr>
+            <p:cNvSpPr/>
+            <p:nvPr/>
+          </p:nvSpPr>
+          <p:spPr>
+            <a:xfrm>
+              <a:off x="2198080" y="3241702"/>
+              <a:ext cx="2743196" cy="2590800"/>
+            </a:xfrm>
+            <a:prstGeom prst="rect">
+              <a:avLst/>
+            </a:prstGeom>
+            <a:solidFill>
+              <a:schemeClr val="accent2">
+                <a:lumMod val="40000"/>
+                <a:lumOff val="60000"/>
+              </a:schemeClr>
+            </a:solidFill>
+          </p:spPr>
+          <p:style>
+            <a:lnRef idx="2">
+              <a:schemeClr val="accent1">
+                <a:shade val="50000"/>
+              </a:schemeClr>
+            </a:lnRef>
+            <a:fillRef idx="1">
+              <a:schemeClr val="accent1"/>
+            </a:fillRef>
+            <a:effectRef idx="0">
+              <a:schemeClr val="accent1"/>
+            </a:effectRef>
+            <a:fontRef idx="minor">
+              <a:schemeClr val="lt1"/>
+            </a:fontRef>
+          </p:style>
+          <p:txBody>
+            <a:bodyPr rtlCol="0" anchor="ctr"/>
+            <a:lstStyle/>
+            <a:p>
+              <a:r>
+                <a:rPr lang="en-US" dirty="0">
+                  <a:solidFill>
+                    <a:schemeClr val="tx1"/>
+                  </a:solidFill>
+                </a:rPr>
+                <a:t>pod</a:t>
+              </a:r>
+            </a:p>
+            <a:p>
+              <a:pPr algn="ctr"/>
+              <a:endParaRPr lang="en-US" dirty="0">
+                <a:solidFill>
+                  <a:schemeClr val="tx1"/>
+                </a:solidFill>
+              </a:endParaRPr>
+            </a:p>
+            <a:p>
+              <a:pPr algn="ctr"/>
+              <a:endParaRPr lang="en-US" dirty="0">
+                <a:solidFill>
+                  <a:schemeClr val="tx1"/>
+                </a:solidFill>
+              </a:endParaRPr>
+            </a:p>
+            <a:p>
+              <a:pPr algn="ctr"/>
+              <a:endParaRPr lang="en-US" dirty="0">
+                <a:solidFill>
+                  <a:schemeClr val="tx1"/>
+                </a:solidFill>
+              </a:endParaRPr>
+            </a:p>
+            <a:p>
+              <a:pPr algn="ctr"/>
+              <a:endParaRPr lang="en-US" dirty="0">
+                <a:solidFill>
+                  <a:schemeClr val="tx1"/>
+                </a:solidFill>
+              </a:endParaRPr>
+            </a:p>
+            <a:p>
+              <a:pPr algn="ctr"/>
+              <a:endParaRPr lang="en-US" dirty="0">
+                <a:solidFill>
+                  <a:schemeClr val="tx1"/>
+                </a:solidFill>
+              </a:endParaRPr>
+            </a:p>
+            <a:p>
+              <a:pPr algn="ctr"/>
+              <a:endParaRPr lang="en-US" dirty="0">
+                <a:solidFill>
+                  <a:schemeClr val="tx1"/>
+                </a:solidFill>
+              </a:endParaRPr>
+            </a:p>
+            <a:p>
+              <a:pPr algn="ctr"/>
+              <a:endParaRPr lang="en-US" dirty="0">
+                <a:solidFill>
+                  <a:schemeClr val="tx1"/>
+                </a:solidFill>
+              </a:endParaRPr>
+            </a:p>
+            <a:p>
+              <a:pPr algn="ctr"/>
+              <a:endParaRPr lang="en-US" dirty="0">
+                <a:solidFill>
+                  <a:schemeClr val="tx1"/>
+                </a:solidFill>
+              </a:endParaRPr>
+            </a:p>
+          </p:txBody>
+        </p:sp>
+        <p:sp>
+          <p:nvSpPr>
+            <p:cNvPr id="6" name="TextBox 5">
+              <a:extLst>
+                <a:ext uri="{FF2B5EF4-FFF2-40B4-BE49-F238E27FC236}">
+                  <a16:creationId xmlns:a16="http://schemas.microsoft.com/office/drawing/2014/main" id="{11B4A212-552B-0344-A3D4-E95EFE5ABBEE}"/>
+                </a:ext>
+              </a:extLst>
+            </p:cNvPr>
+            <p:cNvSpPr txBox="1"/>
+            <p:nvPr/>
+          </p:nvSpPr>
+          <p:spPr>
+            <a:xfrm>
+              <a:off x="2526326" y="4884467"/>
+              <a:ext cx="2086707" cy="461665"/>
+            </a:xfrm>
+            <a:prstGeom prst="rect">
+              <a:avLst/>
+            </a:prstGeom>
+            <a:solidFill>
+              <a:srgbClr val="0070C0"/>
+            </a:solidFill>
+          </p:spPr>
+          <p:txBody>
+            <a:bodyPr wrap="square" rtlCol="0">
+              <a:spAutoFit/>
+            </a:bodyPr>
+            <a:lstStyle/>
+            <a:p>
+              <a:pPr algn="ctr"/>
+              <a:r>
+                <a:rPr lang="en-US" sz="2400" dirty="0">
+                  <a:solidFill>
+                    <a:schemeClr val="bg1"/>
+                  </a:solidFill>
+                </a:rPr>
+                <a:t>server</a:t>
+              </a:r>
+            </a:p>
+          </p:txBody>
+        </p:sp>
+        <p:sp>
+          <p:nvSpPr>
+            <p:cNvPr id="8" name="TextBox 7">
+              <a:extLst>
+                <a:ext uri="{FF2B5EF4-FFF2-40B4-BE49-F238E27FC236}">
+                  <a16:creationId xmlns:a16="http://schemas.microsoft.com/office/drawing/2014/main" id="{D9F2D7E9-9E86-1540-B034-FE5FFEC3940A}"/>
+                </a:ext>
+              </a:extLst>
+            </p:cNvPr>
+            <p:cNvSpPr txBox="1"/>
+            <p:nvPr/>
+          </p:nvSpPr>
+          <p:spPr>
+            <a:xfrm>
+              <a:off x="2526325" y="3728073"/>
+              <a:ext cx="2086707" cy="461665"/>
+            </a:xfrm>
+            <a:prstGeom prst="rect">
+              <a:avLst/>
+            </a:prstGeom>
+            <a:solidFill>
+              <a:srgbClr val="0070C0"/>
+            </a:solidFill>
+          </p:spPr>
+          <p:txBody>
+            <a:bodyPr wrap="square" rtlCol="0">
+              <a:spAutoFit/>
+            </a:bodyPr>
+            <a:lstStyle/>
+            <a:p>
+              <a:pPr algn="ctr"/>
+              <a:r>
+                <a:rPr lang="en-US" sz="2400" dirty="0">
+                  <a:solidFill>
+                    <a:schemeClr val="bg1"/>
+                  </a:solidFill>
+                </a:rPr>
+                <a:t>sidecar</a:t>
+              </a:r>
+            </a:p>
+          </p:txBody>
+        </p:sp>
+        <p:cxnSp>
+          <p:nvCxnSpPr>
+            <p:cNvPr id="10" name="Straight Arrow Connector 9">
+              <a:extLst>
+                <a:ext uri="{FF2B5EF4-FFF2-40B4-BE49-F238E27FC236}">
+                  <a16:creationId xmlns:a16="http://schemas.microsoft.com/office/drawing/2014/main" id="{B7A8DE44-D1F9-DD4A-93A5-AD1532EA8790}"/>
+                </a:ext>
+              </a:extLst>
+            </p:cNvPr>
+            <p:cNvCxnSpPr>
+              <a:cxnSpLocks/>
+              <a:stCxn id="8" idx="2"/>
+              <a:endCxn id="6" idx="0"/>
+            </p:cNvCxnSpPr>
+            <p:nvPr/>
+          </p:nvCxnSpPr>
+          <p:spPr>
+            <a:xfrm>
+              <a:off x="3569679" y="4189738"/>
+              <a:ext cx="1" cy="694729"/>
+            </a:xfrm>
+            <a:prstGeom prst="straightConnector1">
+              <a:avLst/>
+            </a:prstGeom>
+            <a:ln w="38100">
+              <a:headEnd type="triangle"/>
+              <a:tailEnd type="triangle"/>
+            </a:ln>
+          </p:spPr>
+          <p:style>
+            <a:lnRef idx="1">
+              <a:schemeClr val="accent1"/>
+            </a:lnRef>
+            <a:fillRef idx="0">
+              <a:schemeClr val="accent1"/>
+            </a:fillRef>
+            <a:effectRef idx="0">
+              <a:schemeClr val="accent1"/>
+            </a:effectRef>
+            <a:fontRef idx="minor">
+              <a:schemeClr val="tx1"/>
+            </a:fontRef>
+          </p:style>
+        </p:cxnSp>
+        <p:sp>
+          <p:nvSpPr>
+            <p:cNvPr id="14" name="TextBox 13">
+              <a:extLst>
+                <a:ext uri="{FF2B5EF4-FFF2-40B4-BE49-F238E27FC236}">
+                  <a16:creationId xmlns:a16="http://schemas.microsoft.com/office/drawing/2014/main" id="{1FB61EDC-0E81-B540-A563-ECF4A89126C5}"/>
+                </a:ext>
+              </a:extLst>
+            </p:cNvPr>
+            <p:cNvSpPr txBox="1"/>
+            <p:nvPr/>
+          </p:nvSpPr>
+          <p:spPr>
+            <a:xfrm>
+              <a:off x="3569678" y="4365692"/>
+              <a:ext cx="914400" cy="369332"/>
+            </a:xfrm>
+            <a:prstGeom prst="rect">
+              <a:avLst/>
+            </a:prstGeom>
+            <a:noFill/>
+          </p:spPr>
+          <p:txBody>
+            <a:bodyPr wrap="square" rtlCol="0">
+              <a:spAutoFit/>
+            </a:bodyPr>
+            <a:lstStyle/>
+            <a:p>
+              <a:r>
+                <a:rPr lang="en-US" dirty="0"/>
+                <a:t>http</a:t>
+              </a:r>
+            </a:p>
+          </p:txBody>
+        </p:sp>
+      </p:grpSp>
+      <p:grpSp>
+        <p:nvGrpSpPr>
+          <p:cNvPr id="4" name="Group 3">
+            <a:extLst>
+              <a:ext uri="{FF2B5EF4-FFF2-40B4-BE49-F238E27FC236}">
+                <a16:creationId xmlns:a16="http://schemas.microsoft.com/office/drawing/2014/main" id="{3F289F71-9089-3F40-B723-FC60E8FBAFC3}"/>
+              </a:ext>
+            </a:extLst>
+          </p:cNvPr>
+          <p:cNvGrpSpPr/>
+          <p:nvPr/>
+        </p:nvGrpSpPr>
+        <p:grpSpPr>
+          <a:xfrm>
+            <a:off x="7250723" y="2056831"/>
+            <a:ext cx="2743196" cy="2590800"/>
+            <a:chOff x="7250723" y="3244497"/>
+            <a:chExt cx="2743196" cy="2590800"/>
+          </a:xfrm>
+        </p:grpSpPr>
+        <p:sp>
+          <p:nvSpPr>
+            <p:cNvPr id="17" name="Rectangle 16">
+              <a:extLst>
+                <a:ext uri="{FF2B5EF4-FFF2-40B4-BE49-F238E27FC236}">
+                  <a16:creationId xmlns:a16="http://schemas.microsoft.com/office/drawing/2014/main" id="{AD666F2C-3D5A-F045-B292-A9D50E17C412}"/>
+                </a:ext>
+              </a:extLst>
+            </p:cNvPr>
+            <p:cNvSpPr/>
+            <p:nvPr/>
+          </p:nvSpPr>
+          <p:spPr>
+            <a:xfrm>
+              <a:off x="7250723" y="3244497"/>
+              <a:ext cx="2743196" cy="2590800"/>
+            </a:xfrm>
+            <a:prstGeom prst="rect">
+              <a:avLst/>
+            </a:prstGeom>
+            <a:solidFill>
+              <a:schemeClr val="accent2">
+                <a:lumMod val="40000"/>
+                <a:lumOff val="60000"/>
+              </a:schemeClr>
+            </a:solidFill>
+          </p:spPr>
+          <p:style>
+            <a:lnRef idx="2">
+              <a:schemeClr val="accent1">
+                <a:shade val="50000"/>
+              </a:schemeClr>
+            </a:lnRef>
+            <a:fillRef idx="1">
+              <a:schemeClr val="accent1"/>
+            </a:fillRef>
+            <a:effectRef idx="0">
+              <a:schemeClr val="accent1"/>
+            </a:effectRef>
+            <a:fontRef idx="minor">
+              <a:schemeClr val="lt1"/>
+            </a:fontRef>
+          </p:style>
+          <p:txBody>
+            <a:bodyPr rtlCol="0" anchor="ctr"/>
+            <a:lstStyle/>
+            <a:p>
+              <a:r>
+                <a:rPr lang="en-US" dirty="0">
+                  <a:solidFill>
+                    <a:schemeClr val="tx1"/>
+                  </a:solidFill>
+                </a:rPr>
+                <a:t>pod</a:t>
+              </a:r>
+            </a:p>
+            <a:p>
+              <a:pPr algn="ctr"/>
+              <a:endParaRPr lang="en-US" dirty="0">
+                <a:solidFill>
+                  <a:schemeClr val="tx1"/>
+                </a:solidFill>
+              </a:endParaRPr>
+            </a:p>
+            <a:p>
+              <a:pPr algn="ctr"/>
+              <a:endParaRPr lang="en-US" dirty="0">
+                <a:solidFill>
+                  <a:schemeClr val="tx1"/>
+                </a:solidFill>
+              </a:endParaRPr>
+            </a:p>
+            <a:p>
+              <a:pPr algn="ctr"/>
+              <a:endParaRPr lang="en-US" dirty="0">
+                <a:solidFill>
+                  <a:schemeClr val="tx1"/>
+                </a:solidFill>
+              </a:endParaRPr>
+            </a:p>
+            <a:p>
+              <a:pPr algn="ctr"/>
+              <a:endParaRPr lang="en-US" dirty="0">
+                <a:solidFill>
+                  <a:schemeClr val="tx1"/>
+                </a:solidFill>
+              </a:endParaRPr>
+            </a:p>
+            <a:p>
+              <a:pPr algn="ctr"/>
+              <a:endParaRPr lang="en-US" dirty="0">
+                <a:solidFill>
+                  <a:schemeClr val="tx1"/>
+                </a:solidFill>
+              </a:endParaRPr>
+            </a:p>
+            <a:p>
+              <a:pPr algn="ctr"/>
+              <a:endParaRPr lang="en-US" dirty="0">
+                <a:solidFill>
+                  <a:schemeClr val="tx1"/>
+                </a:solidFill>
+              </a:endParaRPr>
+            </a:p>
+            <a:p>
+              <a:pPr algn="ctr"/>
+              <a:endParaRPr lang="en-US" dirty="0">
+                <a:solidFill>
+                  <a:schemeClr val="tx1"/>
+                </a:solidFill>
+              </a:endParaRPr>
+            </a:p>
+            <a:p>
+              <a:pPr algn="ctr"/>
+              <a:endParaRPr lang="en-US" dirty="0">
+                <a:solidFill>
+                  <a:schemeClr val="tx1"/>
+                </a:solidFill>
+              </a:endParaRPr>
+            </a:p>
+          </p:txBody>
+        </p:sp>
+        <p:sp>
+          <p:nvSpPr>
+            <p:cNvPr id="5" name="TextBox 4">
+              <a:extLst>
+                <a:ext uri="{FF2B5EF4-FFF2-40B4-BE49-F238E27FC236}">
+                  <a16:creationId xmlns:a16="http://schemas.microsoft.com/office/drawing/2014/main" id="{6F671711-ADEA-BA44-9C42-365B28D3E225}"/>
+                </a:ext>
+              </a:extLst>
+            </p:cNvPr>
+            <p:cNvSpPr txBox="1"/>
+            <p:nvPr/>
+          </p:nvSpPr>
+          <p:spPr>
+            <a:xfrm>
+              <a:off x="7578968" y="4887261"/>
+              <a:ext cx="2086707" cy="461665"/>
+            </a:xfrm>
+            <a:prstGeom prst="rect">
+              <a:avLst/>
+            </a:prstGeom>
+            <a:solidFill>
+              <a:srgbClr val="0070C0"/>
+            </a:solidFill>
+          </p:spPr>
+          <p:txBody>
+            <a:bodyPr wrap="square" rtlCol="0">
+              <a:spAutoFit/>
+            </a:bodyPr>
+            <a:lstStyle/>
+            <a:p>
+              <a:pPr algn="ctr"/>
+              <a:r>
+                <a:rPr lang="en-US" sz="2400" dirty="0">
+                  <a:solidFill>
+                    <a:schemeClr val="bg1"/>
+                  </a:solidFill>
+                </a:rPr>
+                <a:t>client</a:t>
+              </a:r>
+            </a:p>
+          </p:txBody>
+        </p:sp>
+        <p:sp>
+          <p:nvSpPr>
+            <p:cNvPr id="7" name="TextBox 6">
+              <a:extLst>
+                <a:ext uri="{FF2B5EF4-FFF2-40B4-BE49-F238E27FC236}">
+                  <a16:creationId xmlns:a16="http://schemas.microsoft.com/office/drawing/2014/main" id="{838027F9-2D4D-5749-B999-25E7FCB6BBDF}"/>
+                </a:ext>
+              </a:extLst>
+            </p:cNvPr>
+            <p:cNvSpPr txBox="1"/>
+            <p:nvPr/>
+          </p:nvSpPr>
+          <p:spPr>
+            <a:xfrm>
+              <a:off x="7578969" y="3730868"/>
+              <a:ext cx="2086707" cy="461665"/>
+            </a:xfrm>
+            <a:prstGeom prst="rect">
+              <a:avLst/>
+            </a:prstGeom>
+            <a:solidFill>
+              <a:srgbClr val="0070C0"/>
+            </a:solidFill>
+          </p:spPr>
+          <p:txBody>
+            <a:bodyPr wrap="square" rtlCol="0">
+              <a:spAutoFit/>
+            </a:bodyPr>
+            <a:lstStyle/>
+            <a:p>
+              <a:pPr algn="ctr"/>
+              <a:r>
+                <a:rPr lang="en-US" sz="2400" dirty="0">
+                  <a:solidFill>
+                    <a:schemeClr val="bg1"/>
+                  </a:solidFill>
+                </a:rPr>
+                <a:t>sidecar</a:t>
+              </a:r>
+            </a:p>
+          </p:txBody>
+        </p:sp>
+        <p:cxnSp>
+          <p:nvCxnSpPr>
+            <p:cNvPr id="13" name="Straight Arrow Connector 12">
+              <a:extLst>
+                <a:ext uri="{FF2B5EF4-FFF2-40B4-BE49-F238E27FC236}">
+                  <a16:creationId xmlns:a16="http://schemas.microsoft.com/office/drawing/2014/main" id="{4B9C143A-E261-AB43-8774-F1EB881CF544}"/>
+                </a:ext>
+              </a:extLst>
+            </p:cNvPr>
+            <p:cNvCxnSpPr>
+              <a:cxnSpLocks/>
+            </p:cNvCxnSpPr>
+            <p:nvPr/>
+          </p:nvCxnSpPr>
+          <p:spPr>
+            <a:xfrm>
+              <a:off x="8622321" y="4205789"/>
+              <a:ext cx="1" cy="694729"/>
+            </a:xfrm>
+            <a:prstGeom prst="straightConnector1">
+              <a:avLst/>
+            </a:prstGeom>
+            <a:ln w="38100">
+              <a:headEnd type="triangle"/>
+              <a:tailEnd type="triangle"/>
+            </a:ln>
+          </p:spPr>
+          <p:style>
+            <a:lnRef idx="1">
+              <a:schemeClr val="accent1"/>
+            </a:lnRef>
+            <a:fillRef idx="0">
+              <a:schemeClr val="accent1"/>
+            </a:fillRef>
+            <a:effectRef idx="0">
+              <a:schemeClr val="accent1"/>
+            </a:effectRef>
+            <a:fontRef idx="minor">
+              <a:schemeClr val="tx1"/>
+            </a:fontRef>
+          </p:style>
+        </p:cxnSp>
+        <p:sp>
+          <p:nvSpPr>
+            <p:cNvPr id="15" name="TextBox 14">
+              <a:extLst>
+                <a:ext uri="{FF2B5EF4-FFF2-40B4-BE49-F238E27FC236}">
+                  <a16:creationId xmlns:a16="http://schemas.microsoft.com/office/drawing/2014/main" id="{04C41FC8-B976-0041-BC58-1E4EFB47EB9F}"/>
+                </a:ext>
+              </a:extLst>
+            </p:cNvPr>
+            <p:cNvSpPr txBox="1"/>
+            <p:nvPr/>
+          </p:nvSpPr>
+          <p:spPr>
+            <a:xfrm>
+              <a:off x="8622321" y="4370020"/>
+              <a:ext cx="914400" cy="369332"/>
+            </a:xfrm>
+            <a:prstGeom prst="rect">
+              <a:avLst/>
+            </a:prstGeom>
+            <a:noFill/>
+          </p:spPr>
+          <p:txBody>
+            <a:bodyPr wrap="square" rtlCol="0">
+              <a:spAutoFit/>
+            </a:bodyPr>
+            <a:lstStyle/>
+            <a:p>
+              <a:r>
+                <a:rPr lang="en-US" dirty="0"/>
+                <a:t>http</a:t>
+              </a:r>
+            </a:p>
+          </p:txBody>
+        </p:sp>
+      </p:grpSp>
+      <p:sp>
+        <p:nvSpPr>
+          <p:cNvPr id="18" name="Rounded Rectangle 17">
+            <a:extLst>
+              <a:ext uri="{FF2B5EF4-FFF2-40B4-BE49-F238E27FC236}">
+                <a16:creationId xmlns:a16="http://schemas.microsoft.com/office/drawing/2014/main" id="{D4E854A3-70BB-D644-B0E2-8D12F5D60607}"/>
+              </a:ext>
+            </a:extLst>
+          </p:cNvPr>
+          <p:cNvSpPr/>
+          <p:nvPr/>
+        </p:nvSpPr>
+        <p:spPr>
+          <a:xfrm>
+            <a:off x="5193323" y="357293"/>
+            <a:ext cx="2309447" cy="1031631"/>
+          </a:xfrm>
+          <a:prstGeom prst="roundRect">
+            <a:avLst/>
+          </a:prstGeom>
+        </p:spPr>
+        <p:style>
+          <a:lnRef idx="2">
+            <a:schemeClr val="accent1">
+              <a:shade val="50000"/>
+            </a:schemeClr>
+          </a:lnRef>
+          <a:fillRef idx="1">
+            <a:schemeClr val="accent1"/>
+          </a:fillRef>
+          <a:effectRef idx="0">
+            <a:schemeClr val="accent1"/>
+          </a:effectRef>
+          <a:fontRef idx="minor">
+            <a:schemeClr val="lt1"/>
+          </a:fontRef>
+        </p:style>
+        <p:txBody>
+          <a:bodyPr rtlCol="0" anchor="ctr"/>
+          <a:lstStyle/>
+          <a:p>
+            <a:pPr algn="ctr"/>
+            <a:r>
+              <a:rPr lang="en-US" sz="2400" dirty="0"/>
+              <a:t>Kafka</a:t>
+            </a:r>
+          </a:p>
+        </p:txBody>
+      </p:sp>
+      <p:grpSp>
+        <p:nvGrpSpPr>
+          <p:cNvPr id="42" name="Group 41">
+            <a:extLst>
+              <a:ext uri="{FF2B5EF4-FFF2-40B4-BE49-F238E27FC236}">
+                <a16:creationId xmlns:a16="http://schemas.microsoft.com/office/drawing/2014/main" id="{DC942775-9BB6-CA41-A029-E6DECCAD8FEC}"/>
+              </a:ext>
+            </a:extLst>
+          </p:cNvPr>
+          <p:cNvGrpSpPr/>
+          <p:nvPr/>
+        </p:nvGrpSpPr>
+        <p:grpSpPr>
+          <a:xfrm>
+            <a:off x="2350480" y="2206436"/>
+            <a:ext cx="2743196" cy="2590800"/>
+            <a:chOff x="2198080" y="3241702"/>
+            <a:chExt cx="2743196" cy="2590800"/>
+          </a:xfrm>
+        </p:grpSpPr>
+        <p:sp>
+          <p:nvSpPr>
+            <p:cNvPr id="43" name="Rectangle 42">
+              <a:extLst>
+                <a:ext uri="{FF2B5EF4-FFF2-40B4-BE49-F238E27FC236}">
+                  <a16:creationId xmlns:a16="http://schemas.microsoft.com/office/drawing/2014/main" id="{2CF24FF8-026C-2F4B-9939-4A0332D8C89A}"/>
+                </a:ext>
+              </a:extLst>
+            </p:cNvPr>
+            <p:cNvSpPr/>
+            <p:nvPr/>
+          </p:nvSpPr>
+          <p:spPr>
+            <a:xfrm>
+              <a:off x="2198080" y="3241702"/>
+              <a:ext cx="2743196" cy="2590800"/>
+            </a:xfrm>
+            <a:prstGeom prst="rect">
+              <a:avLst/>
+            </a:prstGeom>
+            <a:solidFill>
+              <a:schemeClr val="accent2">
+                <a:lumMod val="40000"/>
+                <a:lumOff val="60000"/>
+              </a:schemeClr>
+            </a:solidFill>
+          </p:spPr>
+          <p:style>
+            <a:lnRef idx="2">
+              <a:schemeClr val="accent1">
+                <a:shade val="50000"/>
+              </a:schemeClr>
+            </a:lnRef>
+            <a:fillRef idx="1">
+              <a:schemeClr val="accent1"/>
+            </a:fillRef>
+            <a:effectRef idx="0">
+              <a:schemeClr val="accent1"/>
+            </a:effectRef>
+            <a:fontRef idx="minor">
+              <a:schemeClr val="lt1"/>
+            </a:fontRef>
+          </p:style>
+          <p:txBody>
+            <a:bodyPr rtlCol="0" anchor="ctr"/>
+            <a:lstStyle/>
+            <a:p>
+              <a:r>
+                <a:rPr lang="en-US" dirty="0">
+                  <a:solidFill>
+                    <a:schemeClr val="tx1"/>
+                  </a:solidFill>
+                </a:rPr>
+                <a:t>pod</a:t>
+              </a:r>
+            </a:p>
+            <a:p>
+              <a:pPr algn="ctr"/>
+              <a:endParaRPr lang="en-US" dirty="0">
+                <a:solidFill>
+                  <a:schemeClr val="tx1"/>
+                </a:solidFill>
+              </a:endParaRPr>
+            </a:p>
+            <a:p>
+              <a:pPr algn="ctr"/>
+              <a:endParaRPr lang="en-US" dirty="0">
+                <a:solidFill>
+                  <a:schemeClr val="tx1"/>
+                </a:solidFill>
+              </a:endParaRPr>
+            </a:p>
+            <a:p>
+              <a:pPr algn="ctr"/>
+              <a:endParaRPr lang="en-US" dirty="0">
+                <a:solidFill>
+                  <a:schemeClr val="tx1"/>
+                </a:solidFill>
+              </a:endParaRPr>
+            </a:p>
+            <a:p>
+              <a:pPr algn="ctr"/>
+              <a:endParaRPr lang="en-US" dirty="0">
+                <a:solidFill>
+                  <a:schemeClr val="tx1"/>
+                </a:solidFill>
+              </a:endParaRPr>
+            </a:p>
+            <a:p>
+              <a:pPr algn="ctr"/>
+              <a:endParaRPr lang="en-US" dirty="0">
+                <a:solidFill>
+                  <a:schemeClr val="tx1"/>
+                </a:solidFill>
+              </a:endParaRPr>
+            </a:p>
+            <a:p>
+              <a:pPr algn="ctr"/>
+              <a:endParaRPr lang="en-US" dirty="0">
+                <a:solidFill>
+                  <a:schemeClr val="tx1"/>
+                </a:solidFill>
+              </a:endParaRPr>
+            </a:p>
+            <a:p>
+              <a:pPr algn="ctr"/>
+              <a:endParaRPr lang="en-US" dirty="0">
+                <a:solidFill>
+                  <a:schemeClr val="tx1"/>
+                </a:solidFill>
+              </a:endParaRPr>
+            </a:p>
+            <a:p>
+              <a:pPr algn="ctr"/>
+              <a:endParaRPr lang="en-US" dirty="0">
+                <a:solidFill>
+                  <a:schemeClr val="tx1"/>
+                </a:solidFill>
+              </a:endParaRPr>
+            </a:p>
+          </p:txBody>
+        </p:sp>
+        <p:sp>
+          <p:nvSpPr>
+            <p:cNvPr id="44" name="TextBox 43">
+              <a:extLst>
+                <a:ext uri="{FF2B5EF4-FFF2-40B4-BE49-F238E27FC236}">
+                  <a16:creationId xmlns:a16="http://schemas.microsoft.com/office/drawing/2014/main" id="{0DC20C01-7179-1442-8996-4234ACDAAFCA}"/>
+                </a:ext>
+              </a:extLst>
+            </p:cNvPr>
+            <p:cNvSpPr txBox="1"/>
+            <p:nvPr/>
+          </p:nvSpPr>
+          <p:spPr>
+            <a:xfrm>
+              <a:off x="2526326" y="4884467"/>
+              <a:ext cx="2086707" cy="461665"/>
+            </a:xfrm>
+            <a:prstGeom prst="rect">
+              <a:avLst/>
+            </a:prstGeom>
+            <a:solidFill>
+              <a:srgbClr val="0070C0"/>
+            </a:solidFill>
+          </p:spPr>
+          <p:txBody>
+            <a:bodyPr wrap="square" rtlCol="0">
+              <a:spAutoFit/>
+            </a:bodyPr>
+            <a:lstStyle/>
+            <a:p>
+              <a:pPr algn="ctr"/>
+              <a:r>
+                <a:rPr lang="en-US" sz="2400" dirty="0">
+                  <a:solidFill>
+                    <a:schemeClr val="bg1"/>
+                  </a:solidFill>
+                </a:rPr>
+                <a:t>server</a:t>
+              </a:r>
+            </a:p>
+          </p:txBody>
+        </p:sp>
+        <p:sp>
+          <p:nvSpPr>
+            <p:cNvPr id="45" name="TextBox 44">
+              <a:extLst>
+                <a:ext uri="{FF2B5EF4-FFF2-40B4-BE49-F238E27FC236}">
+                  <a16:creationId xmlns:a16="http://schemas.microsoft.com/office/drawing/2014/main" id="{3223ADC3-ADB5-F744-A6DF-3D01F62E91F8}"/>
+                </a:ext>
+              </a:extLst>
+            </p:cNvPr>
+            <p:cNvSpPr txBox="1"/>
+            <p:nvPr/>
+          </p:nvSpPr>
+          <p:spPr>
+            <a:xfrm>
+              <a:off x="2526325" y="3728073"/>
+              <a:ext cx="2086707" cy="461665"/>
+            </a:xfrm>
+            <a:prstGeom prst="rect">
+              <a:avLst/>
+            </a:prstGeom>
+            <a:solidFill>
+              <a:srgbClr val="0070C0"/>
+            </a:solidFill>
+          </p:spPr>
+          <p:txBody>
+            <a:bodyPr wrap="square" rtlCol="0">
+              <a:spAutoFit/>
+            </a:bodyPr>
+            <a:lstStyle/>
+            <a:p>
+              <a:pPr algn="ctr"/>
+              <a:r>
+                <a:rPr lang="en-US" sz="2400" dirty="0">
+                  <a:solidFill>
+                    <a:schemeClr val="bg1"/>
+                  </a:solidFill>
+                </a:rPr>
+                <a:t>sidecar</a:t>
+              </a:r>
+            </a:p>
+          </p:txBody>
+        </p:sp>
+        <p:cxnSp>
+          <p:nvCxnSpPr>
+            <p:cNvPr id="46" name="Straight Arrow Connector 45">
+              <a:extLst>
+                <a:ext uri="{FF2B5EF4-FFF2-40B4-BE49-F238E27FC236}">
+                  <a16:creationId xmlns:a16="http://schemas.microsoft.com/office/drawing/2014/main" id="{729BE499-DD58-014B-A4D5-EDC018FF7077}"/>
+                </a:ext>
+              </a:extLst>
+            </p:cNvPr>
+            <p:cNvCxnSpPr>
+              <a:cxnSpLocks/>
+              <a:stCxn id="45" idx="2"/>
+              <a:endCxn id="44" idx="0"/>
+            </p:cNvCxnSpPr>
+            <p:nvPr/>
+          </p:nvCxnSpPr>
+          <p:spPr>
+            <a:xfrm>
+              <a:off x="3569679" y="4189738"/>
+              <a:ext cx="1" cy="694729"/>
+            </a:xfrm>
+            <a:prstGeom prst="straightConnector1">
+              <a:avLst/>
+            </a:prstGeom>
+            <a:ln w="38100">
+              <a:headEnd type="triangle"/>
+              <a:tailEnd type="triangle"/>
+            </a:ln>
+          </p:spPr>
+          <p:style>
+            <a:lnRef idx="1">
+              <a:schemeClr val="accent1"/>
+            </a:lnRef>
+            <a:fillRef idx="0">
+              <a:schemeClr val="accent1"/>
+            </a:fillRef>
+            <a:effectRef idx="0">
+              <a:schemeClr val="accent1"/>
+            </a:effectRef>
+            <a:fontRef idx="minor">
+              <a:schemeClr val="tx1"/>
+            </a:fontRef>
+          </p:style>
+        </p:cxnSp>
+        <p:sp>
+          <p:nvSpPr>
+            <p:cNvPr id="47" name="TextBox 46">
+              <a:extLst>
+                <a:ext uri="{FF2B5EF4-FFF2-40B4-BE49-F238E27FC236}">
+                  <a16:creationId xmlns:a16="http://schemas.microsoft.com/office/drawing/2014/main" id="{159C2211-6729-7F42-AEC4-799CACA59D70}"/>
+                </a:ext>
+              </a:extLst>
+            </p:cNvPr>
+            <p:cNvSpPr txBox="1"/>
+            <p:nvPr/>
+          </p:nvSpPr>
+          <p:spPr>
+            <a:xfrm>
+              <a:off x="3569678" y="4365692"/>
+              <a:ext cx="914400" cy="369332"/>
+            </a:xfrm>
+            <a:prstGeom prst="rect">
+              <a:avLst/>
+            </a:prstGeom>
+            <a:noFill/>
+          </p:spPr>
+          <p:txBody>
+            <a:bodyPr wrap="square" rtlCol="0">
+              <a:spAutoFit/>
+            </a:bodyPr>
+            <a:lstStyle/>
+            <a:p>
+              <a:r>
+                <a:rPr lang="en-US" dirty="0"/>
+                <a:t>http</a:t>
+              </a:r>
+            </a:p>
+          </p:txBody>
+        </p:sp>
+      </p:grpSp>
+      <p:grpSp>
+        <p:nvGrpSpPr>
+          <p:cNvPr id="48" name="Group 47">
+            <a:extLst>
+              <a:ext uri="{FF2B5EF4-FFF2-40B4-BE49-F238E27FC236}">
+                <a16:creationId xmlns:a16="http://schemas.microsoft.com/office/drawing/2014/main" id="{93BBD36D-361F-9640-9A84-6C175F7AE521}"/>
+              </a:ext>
+            </a:extLst>
+          </p:cNvPr>
+          <p:cNvGrpSpPr/>
+          <p:nvPr/>
+        </p:nvGrpSpPr>
+        <p:grpSpPr>
+          <a:xfrm>
+            <a:off x="2502880" y="2358836"/>
             <a:ext cx="2743196" cy="2590800"/>
             <a:chOff x="2198080" y="3241702"/>
             <a:chExt cx="2743196" cy="2590800"/>
@@ -4005,13 +5589,13 @@
           <p:spPr>
             <a:xfrm>
               <a:off x="2526326" y="4884467"/>
-              <a:ext cx="2086707" cy="400110"/>
+              <a:ext cx="2086707" cy="461665"/>
             </a:xfrm>
             <a:prstGeom prst="rect">
               <a:avLst/>
             </a:prstGeom>
             <a:solidFill>
-              <a:srgbClr val="0070C0"/>
+              <a:schemeClr val="accent6"/>
             </a:solidFill>
           </p:spPr>
           <p:txBody>
@@ -4022,12 +5606,12 @@
             <a:p>
               <a:pPr algn="ctr"/>
               <a:r>
-                <a:rPr lang="en-US" sz="2000" dirty="0">
+                <a:rPr lang="en-US" sz="2400" dirty="0">
                   <a:solidFill>
                     <a:schemeClr val="bg1"/>
                   </a:solidFill>
                 </a:rPr>
-                <a:t>App Component</a:t>
+                <a:t>App Comp. A</a:t>
               </a:r>
             </a:p>
           </p:txBody>
@@ -4154,1414 +5738,6 @@
           </p:txBody>
         </p:sp>
       </p:grpSp>
-      <p:sp>
-        <p:nvSpPr>
-          <p:cNvPr id="11" name="Slide Number Placeholder 10">
-            <a:extLst>
-              <a:ext uri="{FF2B5EF4-FFF2-40B4-BE49-F238E27FC236}">
-                <a16:creationId xmlns:a16="http://schemas.microsoft.com/office/drawing/2014/main" id="{6D8DB929-A3D6-BE42-AABF-DE04CA8C986F}"/>
-              </a:ext>
-            </a:extLst>
-          </p:cNvPr>
-          <p:cNvSpPr>
-            <a:spLocks noGrp="1"/>
-          </p:cNvSpPr>
-          <p:nvPr>
-            <p:ph type="sldNum" sz="quarter" idx="12"/>
-          </p:nvPr>
-        </p:nvSpPr>
-        <p:spPr/>
-        <p:txBody>
-          <a:bodyPr/>
-          <a:lstStyle/>
-          <a:p>
-            <a:fld id="{FC517010-E647-2249-A958-B3027541DB25}" type="slidenum">
-              <a:rPr lang="en-US" smtClean="0"/>
-              <a:t>1</a:t>
-            </a:fld>
-            <a:endParaRPr lang="en-US"/>
-          </a:p>
-        </p:txBody>
-      </p:sp>
-    </p:spTree>
-    <p:extLst>
-      <p:ext uri="{BB962C8B-B14F-4D97-AF65-F5344CB8AC3E}">
-        <p14:creationId xmlns:p14="http://schemas.microsoft.com/office/powerpoint/2010/main" val="1264973388"/>
-      </p:ext>
-    </p:extLst>
-  </p:cSld>
-  <p:clrMapOvr>
-    <a:masterClrMapping/>
-  </p:clrMapOvr>
-  <p:timing>
-    <p:tnLst>
-      <p:par>
-        <p:cTn id="1" dur="indefinite" restart="never" nodeType="tmRoot">
-          <p:childTnLst>
-            <p:seq concurrent="1" nextAc="seek">
-              <p:cTn id="2" dur="indefinite" nodeType="mainSeq">
-                <p:childTnLst>
-                  <p:par>
-                    <p:cTn id="3" fill="hold">
-                      <p:stCondLst>
-                        <p:cond delay="indefinite"/>
-                        <p:cond evt="onBegin" delay="0">
-                          <p:tn val="2"/>
-                        </p:cond>
-                      </p:stCondLst>
-                      <p:childTnLst>
-                        <p:par>
-                          <p:cTn id="4" fill="hold">
-                            <p:stCondLst>
-                              <p:cond delay="0"/>
-                            </p:stCondLst>
-                            <p:childTnLst>
-                              <p:par>
-                                <p:cTn id="5" presetID="1" presetClass="entr" presetSubtype="0" fill="hold" nodeType="withEffect">
-                                  <p:stCondLst>
-                                    <p:cond delay="0"/>
-                                  </p:stCondLst>
-                                  <p:childTnLst>
-                                    <p:set>
-                                      <p:cBhvr>
-                                        <p:cTn id="6" dur="1" fill="hold">
-                                          <p:stCondLst>
-                                            <p:cond delay="0"/>
-                                          </p:stCondLst>
-                                        </p:cTn>
-                                        <p:tgtEl>
-                                          <p:spTgt spid="48"/>
-                                        </p:tgtEl>
-                                        <p:attrNameLst>
-                                          <p:attrName>style.visibility</p:attrName>
-                                        </p:attrNameLst>
-                                      </p:cBhvr>
-                                      <p:to>
-                                        <p:strVal val="visible"/>
-                                      </p:to>
-                                    </p:set>
-                                  </p:childTnLst>
-                                </p:cTn>
-                              </p:par>
-                            </p:childTnLst>
-                          </p:cTn>
-                        </p:par>
-                      </p:childTnLst>
-                    </p:cTn>
-                  </p:par>
-                </p:childTnLst>
-              </p:cTn>
-              <p:prevCondLst>
-                <p:cond evt="onPrev" delay="0">
-                  <p:tgtEl>
-                    <p:sldTgt/>
-                  </p:tgtEl>
-                </p:cond>
-              </p:prevCondLst>
-              <p:nextCondLst>
-                <p:cond evt="onNext" delay="0">
-                  <p:tgtEl>
-                    <p:sldTgt/>
-                  </p:tgtEl>
-                </p:cond>
-              </p:nextCondLst>
-            </p:seq>
-          </p:childTnLst>
-        </p:cTn>
-      </p:par>
-    </p:tnLst>
-  </p:timing>
-</p:sld>
-</file>
-
-<file path=ppt/slides/slide2.xml><?xml version="1.0" encoding="utf-8"?>
-<p:sld xmlns:a="http://schemas.openxmlformats.org/drawingml/2006/main" xmlns:r="http://schemas.openxmlformats.org/officeDocument/2006/relationships" xmlns:p="http://schemas.openxmlformats.org/presentationml/2006/main">
-  <p:cSld>
-    <p:spTree>
-      <p:nvGrpSpPr>
-        <p:cNvPr id="1" name=""/>
-        <p:cNvGrpSpPr/>
-        <p:nvPr/>
-      </p:nvGrpSpPr>
-      <p:grpSpPr>
-        <a:xfrm>
-          <a:off x="0" y="0"/>
-          <a:ext cx="0" cy="0"/>
-          <a:chOff x="0" y="0"/>
-          <a:chExt cx="0" cy="0"/>
-        </a:xfrm>
-      </p:grpSpPr>
-      <p:grpSp>
-        <p:nvGrpSpPr>
-          <p:cNvPr id="3" name="Group 2">
-            <a:extLst>
-              <a:ext uri="{FF2B5EF4-FFF2-40B4-BE49-F238E27FC236}">
-                <a16:creationId xmlns:a16="http://schemas.microsoft.com/office/drawing/2014/main" id="{3F10BDA9-92A7-A243-BC5C-D58C392080CE}"/>
-              </a:ext>
-            </a:extLst>
-          </p:cNvPr>
-          <p:cNvGrpSpPr/>
-          <p:nvPr/>
-        </p:nvGrpSpPr>
-        <p:grpSpPr>
-          <a:xfrm>
-            <a:off x="2198080" y="2054036"/>
-            <a:ext cx="2743196" cy="2590800"/>
-            <a:chOff x="2198080" y="3241702"/>
-            <a:chExt cx="2743196" cy="2590800"/>
-          </a:xfrm>
-        </p:grpSpPr>
-        <p:sp>
-          <p:nvSpPr>
-            <p:cNvPr id="16" name="Rectangle 15">
-              <a:extLst>
-                <a:ext uri="{FF2B5EF4-FFF2-40B4-BE49-F238E27FC236}">
-                  <a16:creationId xmlns:a16="http://schemas.microsoft.com/office/drawing/2014/main" id="{43494236-B475-E34B-BBE0-A28246B3C579}"/>
-                </a:ext>
-              </a:extLst>
-            </p:cNvPr>
-            <p:cNvSpPr/>
-            <p:nvPr/>
-          </p:nvSpPr>
-          <p:spPr>
-            <a:xfrm>
-              <a:off x="2198080" y="3241702"/>
-              <a:ext cx="2743196" cy="2590800"/>
-            </a:xfrm>
-            <a:prstGeom prst="rect">
-              <a:avLst/>
-            </a:prstGeom>
-            <a:solidFill>
-              <a:schemeClr val="accent2">
-                <a:lumMod val="40000"/>
-                <a:lumOff val="60000"/>
-              </a:schemeClr>
-            </a:solidFill>
-          </p:spPr>
-          <p:style>
-            <a:lnRef idx="2">
-              <a:schemeClr val="accent1">
-                <a:shade val="50000"/>
-              </a:schemeClr>
-            </a:lnRef>
-            <a:fillRef idx="1">
-              <a:schemeClr val="accent1"/>
-            </a:fillRef>
-            <a:effectRef idx="0">
-              <a:schemeClr val="accent1"/>
-            </a:effectRef>
-            <a:fontRef idx="minor">
-              <a:schemeClr val="lt1"/>
-            </a:fontRef>
-          </p:style>
-          <p:txBody>
-            <a:bodyPr rtlCol="0" anchor="ctr"/>
-            <a:lstStyle/>
-            <a:p>
-              <a:r>
-                <a:rPr lang="en-US" dirty="0">
-                  <a:solidFill>
-                    <a:schemeClr val="tx1"/>
-                  </a:solidFill>
-                </a:rPr>
-                <a:t>pod</a:t>
-              </a:r>
-            </a:p>
-            <a:p>
-              <a:pPr algn="ctr"/>
-              <a:endParaRPr lang="en-US" dirty="0">
-                <a:solidFill>
-                  <a:schemeClr val="tx1"/>
-                </a:solidFill>
-              </a:endParaRPr>
-            </a:p>
-            <a:p>
-              <a:pPr algn="ctr"/>
-              <a:endParaRPr lang="en-US" dirty="0">
-                <a:solidFill>
-                  <a:schemeClr val="tx1"/>
-                </a:solidFill>
-              </a:endParaRPr>
-            </a:p>
-            <a:p>
-              <a:pPr algn="ctr"/>
-              <a:endParaRPr lang="en-US" dirty="0">
-                <a:solidFill>
-                  <a:schemeClr val="tx1"/>
-                </a:solidFill>
-              </a:endParaRPr>
-            </a:p>
-            <a:p>
-              <a:pPr algn="ctr"/>
-              <a:endParaRPr lang="en-US" dirty="0">
-                <a:solidFill>
-                  <a:schemeClr val="tx1"/>
-                </a:solidFill>
-              </a:endParaRPr>
-            </a:p>
-            <a:p>
-              <a:pPr algn="ctr"/>
-              <a:endParaRPr lang="en-US" dirty="0">
-                <a:solidFill>
-                  <a:schemeClr val="tx1"/>
-                </a:solidFill>
-              </a:endParaRPr>
-            </a:p>
-            <a:p>
-              <a:pPr algn="ctr"/>
-              <a:endParaRPr lang="en-US" dirty="0">
-                <a:solidFill>
-                  <a:schemeClr val="tx1"/>
-                </a:solidFill>
-              </a:endParaRPr>
-            </a:p>
-            <a:p>
-              <a:pPr algn="ctr"/>
-              <a:endParaRPr lang="en-US" dirty="0">
-                <a:solidFill>
-                  <a:schemeClr val="tx1"/>
-                </a:solidFill>
-              </a:endParaRPr>
-            </a:p>
-            <a:p>
-              <a:pPr algn="ctr"/>
-              <a:endParaRPr lang="en-US" dirty="0">
-                <a:solidFill>
-                  <a:schemeClr val="tx1"/>
-                </a:solidFill>
-              </a:endParaRPr>
-            </a:p>
-          </p:txBody>
-        </p:sp>
-        <p:sp>
-          <p:nvSpPr>
-            <p:cNvPr id="6" name="TextBox 5">
-              <a:extLst>
-                <a:ext uri="{FF2B5EF4-FFF2-40B4-BE49-F238E27FC236}">
-                  <a16:creationId xmlns:a16="http://schemas.microsoft.com/office/drawing/2014/main" id="{11B4A212-552B-0344-A3D4-E95EFE5ABBEE}"/>
-                </a:ext>
-              </a:extLst>
-            </p:cNvPr>
-            <p:cNvSpPr txBox="1"/>
-            <p:nvPr/>
-          </p:nvSpPr>
-          <p:spPr>
-            <a:xfrm>
-              <a:off x="2526326" y="4884467"/>
-              <a:ext cx="2086707" cy="461665"/>
-            </a:xfrm>
-            <a:prstGeom prst="rect">
-              <a:avLst/>
-            </a:prstGeom>
-            <a:solidFill>
-              <a:srgbClr val="0070C0"/>
-            </a:solidFill>
-          </p:spPr>
-          <p:txBody>
-            <a:bodyPr wrap="square" rtlCol="0">
-              <a:spAutoFit/>
-            </a:bodyPr>
-            <a:lstStyle/>
-            <a:p>
-              <a:pPr algn="ctr"/>
-              <a:r>
-                <a:rPr lang="en-US" sz="2400" dirty="0">
-                  <a:solidFill>
-                    <a:schemeClr val="bg1"/>
-                  </a:solidFill>
-                </a:rPr>
-                <a:t>server</a:t>
-              </a:r>
-            </a:p>
-          </p:txBody>
-        </p:sp>
-        <p:sp>
-          <p:nvSpPr>
-            <p:cNvPr id="8" name="TextBox 7">
-              <a:extLst>
-                <a:ext uri="{FF2B5EF4-FFF2-40B4-BE49-F238E27FC236}">
-                  <a16:creationId xmlns:a16="http://schemas.microsoft.com/office/drawing/2014/main" id="{D9F2D7E9-9E86-1540-B034-FE5FFEC3940A}"/>
-                </a:ext>
-              </a:extLst>
-            </p:cNvPr>
-            <p:cNvSpPr txBox="1"/>
-            <p:nvPr/>
-          </p:nvSpPr>
-          <p:spPr>
-            <a:xfrm>
-              <a:off x="2526325" y="3728073"/>
-              <a:ext cx="2086707" cy="461665"/>
-            </a:xfrm>
-            <a:prstGeom prst="rect">
-              <a:avLst/>
-            </a:prstGeom>
-            <a:solidFill>
-              <a:srgbClr val="0070C0"/>
-            </a:solidFill>
-          </p:spPr>
-          <p:txBody>
-            <a:bodyPr wrap="square" rtlCol="0">
-              <a:spAutoFit/>
-            </a:bodyPr>
-            <a:lstStyle/>
-            <a:p>
-              <a:pPr algn="ctr"/>
-              <a:r>
-                <a:rPr lang="en-US" sz="2400" dirty="0">
-                  <a:solidFill>
-                    <a:schemeClr val="bg1"/>
-                  </a:solidFill>
-                </a:rPr>
-                <a:t>sidecar</a:t>
-              </a:r>
-            </a:p>
-          </p:txBody>
-        </p:sp>
-        <p:cxnSp>
-          <p:nvCxnSpPr>
-            <p:cNvPr id="10" name="Straight Arrow Connector 9">
-              <a:extLst>
-                <a:ext uri="{FF2B5EF4-FFF2-40B4-BE49-F238E27FC236}">
-                  <a16:creationId xmlns:a16="http://schemas.microsoft.com/office/drawing/2014/main" id="{B7A8DE44-D1F9-DD4A-93A5-AD1532EA8790}"/>
-                </a:ext>
-              </a:extLst>
-            </p:cNvPr>
-            <p:cNvCxnSpPr>
-              <a:cxnSpLocks/>
-              <a:stCxn id="8" idx="2"/>
-              <a:endCxn id="6" idx="0"/>
-            </p:cNvCxnSpPr>
-            <p:nvPr/>
-          </p:nvCxnSpPr>
-          <p:spPr>
-            <a:xfrm>
-              <a:off x="3569679" y="4189738"/>
-              <a:ext cx="1" cy="694729"/>
-            </a:xfrm>
-            <a:prstGeom prst="straightConnector1">
-              <a:avLst/>
-            </a:prstGeom>
-            <a:ln w="38100">
-              <a:headEnd type="triangle"/>
-              <a:tailEnd type="triangle"/>
-            </a:ln>
-          </p:spPr>
-          <p:style>
-            <a:lnRef idx="1">
-              <a:schemeClr val="accent1"/>
-            </a:lnRef>
-            <a:fillRef idx="0">
-              <a:schemeClr val="accent1"/>
-            </a:fillRef>
-            <a:effectRef idx="0">
-              <a:schemeClr val="accent1"/>
-            </a:effectRef>
-            <a:fontRef idx="minor">
-              <a:schemeClr val="tx1"/>
-            </a:fontRef>
-          </p:style>
-        </p:cxnSp>
-        <p:sp>
-          <p:nvSpPr>
-            <p:cNvPr id="14" name="TextBox 13">
-              <a:extLst>
-                <a:ext uri="{FF2B5EF4-FFF2-40B4-BE49-F238E27FC236}">
-                  <a16:creationId xmlns:a16="http://schemas.microsoft.com/office/drawing/2014/main" id="{1FB61EDC-0E81-B540-A563-ECF4A89126C5}"/>
-                </a:ext>
-              </a:extLst>
-            </p:cNvPr>
-            <p:cNvSpPr txBox="1"/>
-            <p:nvPr/>
-          </p:nvSpPr>
-          <p:spPr>
-            <a:xfrm>
-              <a:off x="3569678" y="4365692"/>
-              <a:ext cx="914400" cy="369332"/>
-            </a:xfrm>
-            <a:prstGeom prst="rect">
-              <a:avLst/>
-            </a:prstGeom>
-            <a:noFill/>
-          </p:spPr>
-          <p:txBody>
-            <a:bodyPr wrap="square" rtlCol="0">
-              <a:spAutoFit/>
-            </a:bodyPr>
-            <a:lstStyle/>
-            <a:p>
-              <a:r>
-                <a:rPr lang="en-US" dirty="0"/>
-                <a:t>http</a:t>
-              </a:r>
-            </a:p>
-          </p:txBody>
-        </p:sp>
-      </p:grpSp>
-      <p:grpSp>
-        <p:nvGrpSpPr>
-          <p:cNvPr id="4" name="Group 3">
-            <a:extLst>
-              <a:ext uri="{FF2B5EF4-FFF2-40B4-BE49-F238E27FC236}">
-                <a16:creationId xmlns:a16="http://schemas.microsoft.com/office/drawing/2014/main" id="{3F289F71-9089-3F40-B723-FC60E8FBAFC3}"/>
-              </a:ext>
-            </a:extLst>
-          </p:cNvPr>
-          <p:cNvGrpSpPr/>
-          <p:nvPr/>
-        </p:nvGrpSpPr>
-        <p:grpSpPr>
-          <a:xfrm>
-            <a:off x="7250723" y="2056831"/>
-            <a:ext cx="2743196" cy="2590800"/>
-            <a:chOff x="7250723" y="3244497"/>
-            <a:chExt cx="2743196" cy="2590800"/>
-          </a:xfrm>
-        </p:grpSpPr>
-        <p:sp>
-          <p:nvSpPr>
-            <p:cNvPr id="17" name="Rectangle 16">
-              <a:extLst>
-                <a:ext uri="{FF2B5EF4-FFF2-40B4-BE49-F238E27FC236}">
-                  <a16:creationId xmlns:a16="http://schemas.microsoft.com/office/drawing/2014/main" id="{AD666F2C-3D5A-F045-B292-A9D50E17C412}"/>
-                </a:ext>
-              </a:extLst>
-            </p:cNvPr>
-            <p:cNvSpPr/>
-            <p:nvPr/>
-          </p:nvSpPr>
-          <p:spPr>
-            <a:xfrm>
-              <a:off x="7250723" y="3244497"/>
-              <a:ext cx="2743196" cy="2590800"/>
-            </a:xfrm>
-            <a:prstGeom prst="rect">
-              <a:avLst/>
-            </a:prstGeom>
-            <a:solidFill>
-              <a:schemeClr val="accent2">
-                <a:lumMod val="40000"/>
-                <a:lumOff val="60000"/>
-              </a:schemeClr>
-            </a:solidFill>
-          </p:spPr>
-          <p:style>
-            <a:lnRef idx="2">
-              <a:schemeClr val="accent1">
-                <a:shade val="50000"/>
-              </a:schemeClr>
-            </a:lnRef>
-            <a:fillRef idx="1">
-              <a:schemeClr val="accent1"/>
-            </a:fillRef>
-            <a:effectRef idx="0">
-              <a:schemeClr val="accent1"/>
-            </a:effectRef>
-            <a:fontRef idx="minor">
-              <a:schemeClr val="lt1"/>
-            </a:fontRef>
-          </p:style>
-          <p:txBody>
-            <a:bodyPr rtlCol="0" anchor="ctr"/>
-            <a:lstStyle/>
-            <a:p>
-              <a:r>
-                <a:rPr lang="en-US" dirty="0">
-                  <a:solidFill>
-                    <a:schemeClr val="tx1"/>
-                  </a:solidFill>
-                </a:rPr>
-                <a:t>pod</a:t>
-              </a:r>
-            </a:p>
-            <a:p>
-              <a:pPr algn="ctr"/>
-              <a:endParaRPr lang="en-US" dirty="0">
-                <a:solidFill>
-                  <a:schemeClr val="tx1"/>
-                </a:solidFill>
-              </a:endParaRPr>
-            </a:p>
-            <a:p>
-              <a:pPr algn="ctr"/>
-              <a:endParaRPr lang="en-US" dirty="0">
-                <a:solidFill>
-                  <a:schemeClr val="tx1"/>
-                </a:solidFill>
-              </a:endParaRPr>
-            </a:p>
-            <a:p>
-              <a:pPr algn="ctr"/>
-              <a:endParaRPr lang="en-US" dirty="0">
-                <a:solidFill>
-                  <a:schemeClr val="tx1"/>
-                </a:solidFill>
-              </a:endParaRPr>
-            </a:p>
-            <a:p>
-              <a:pPr algn="ctr"/>
-              <a:endParaRPr lang="en-US" dirty="0">
-                <a:solidFill>
-                  <a:schemeClr val="tx1"/>
-                </a:solidFill>
-              </a:endParaRPr>
-            </a:p>
-            <a:p>
-              <a:pPr algn="ctr"/>
-              <a:endParaRPr lang="en-US" dirty="0">
-                <a:solidFill>
-                  <a:schemeClr val="tx1"/>
-                </a:solidFill>
-              </a:endParaRPr>
-            </a:p>
-            <a:p>
-              <a:pPr algn="ctr"/>
-              <a:endParaRPr lang="en-US" dirty="0">
-                <a:solidFill>
-                  <a:schemeClr val="tx1"/>
-                </a:solidFill>
-              </a:endParaRPr>
-            </a:p>
-            <a:p>
-              <a:pPr algn="ctr"/>
-              <a:endParaRPr lang="en-US" dirty="0">
-                <a:solidFill>
-                  <a:schemeClr val="tx1"/>
-                </a:solidFill>
-              </a:endParaRPr>
-            </a:p>
-            <a:p>
-              <a:pPr algn="ctr"/>
-              <a:endParaRPr lang="en-US" dirty="0">
-                <a:solidFill>
-                  <a:schemeClr val="tx1"/>
-                </a:solidFill>
-              </a:endParaRPr>
-            </a:p>
-          </p:txBody>
-        </p:sp>
-        <p:sp>
-          <p:nvSpPr>
-            <p:cNvPr id="5" name="TextBox 4">
-              <a:extLst>
-                <a:ext uri="{FF2B5EF4-FFF2-40B4-BE49-F238E27FC236}">
-                  <a16:creationId xmlns:a16="http://schemas.microsoft.com/office/drawing/2014/main" id="{6F671711-ADEA-BA44-9C42-365B28D3E225}"/>
-                </a:ext>
-              </a:extLst>
-            </p:cNvPr>
-            <p:cNvSpPr txBox="1"/>
-            <p:nvPr/>
-          </p:nvSpPr>
-          <p:spPr>
-            <a:xfrm>
-              <a:off x="7578968" y="4887261"/>
-              <a:ext cx="2086707" cy="461665"/>
-            </a:xfrm>
-            <a:prstGeom prst="rect">
-              <a:avLst/>
-            </a:prstGeom>
-            <a:solidFill>
-              <a:srgbClr val="0070C0"/>
-            </a:solidFill>
-          </p:spPr>
-          <p:txBody>
-            <a:bodyPr wrap="square" rtlCol="0">
-              <a:spAutoFit/>
-            </a:bodyPr>
-            <a:lstStyle/>
-            <a:p>
-              <a:pPr algn="ctr"/>
-              <a:r>
-                <a:rPr lang="en-US" sz="2400" dirty="0">
-                  <a:solidFill>
-                    <a:schemeClr val="bg1"/>
-                  </a:solidFill>
-                </a:rPr>
-                <a:t>client</a:t>
-              </a:r>
-            </a:p>
-          </p:txBody>
-        </p:sp>
-        <p:sp>
-          <p:nvSpPr>
-            <p:cNvPr id="7" name="TextBox 6">
-              <a:extLst>
-                <a:ext uri="{FF2B5EF4-FFF2-40B4-BE49-F238E27FC236}">
-                  <a16:creationId xmlns:a16="http://schemas.microsoft.com/office/drawing/2014/main" id="{838027F9-2D4D-5749-B999-25E7FCB6BBDF}"/>
-                </a:ext>
-              </a:extLst>
-            </p:cNvPr>
-            <p:cNvSpPr txBox="1"/>
-            <p:nvPr/>
-          </p:nvSpPr>
-          <p:spPr>
-            <a:xfrm>
-              <a:off x="7578969" y="3730868"/>
-              <a:ext cx="2086707" cy="461665"/>
-            </a:xfrm>
-            <a:prstGeom prst="rect">
-              <a:avLst/>
-            </a:prstGeom>
-            <a:solidFill>
-              <a:srgbClr val="0070C0"/>
-            </a:solidFill>
-          </p:spPr>
-          <p:txBody>
-            <a:bodyPr wrap="square" rtlCol="0">
-              <a:spAutoFit/>
-            </a:bodyPr>
-            <a:lstStyle/>
-            <a:p>
-              <a:pPr algn="ctr"/>
-              <a:r>
-                <a:rPr lang="en-US" sz="2400" dirty="0">
-                  <a:solidFill>
-                    <a:schemeClr val="bg1"/>
-                  </a:solidFill>
-                </a:rPr>
-                <a:t>sidecar</a:t>
-              </a:r>
-            </a:p>
-          </p:txBody>
-        </p:sp>
-        <p:cxnSp>
-          <p:nvCxnSpPr>
-            <p:cNvPr id="13" name="Straight Arrow Connector 12">
-              <a:extLst>
-                <a:ext uri="{FF2B5EF4-FFF2-40B4-BE49-F238E27FC236}">
-                  <a16:creationId xmlns:a16="http://schemas.microsoft.com/office/drawing/2014/main" id="{4B9C143A-E261-AB43-8774-F1EB881CF544}"/>
-                </a:ext>
-              </a:extLst>
-            </p:cNvPr>
-            <p:cNvCxnSpPr>
-              <a:cxnSpLocks/>
-            </p:cNvCxnSpPr>
-            <p:nvPr/>
-          </p:nvCxnSpPr>
-          <p:spPr>
-            <a:xfrm>
-              <a:off x="8622321" y="4205789"/>
-              <a:ext cx="1" cy="694729"/>
-            </a:xfrm>
-            <a:prstGeom prst="straightConnector1">
-              <a:avLst/>
-            </a:prstGeom>
-            <a:ln w="38100">
-              <a:headEnd type="triangle"/>
-              <a:tailEnd type="triangle"/>
-            </a:ln>
-          </p:spPr>
-          <p:style>
-            <a:lnRef idx="1">
-              <a:schemeClr val="accent1"/>
-            </a:lnRef>
-            <a:fillRef idx="0">
-              <a:schemeClr val="accent1"/>
-            </a:fillRef>
-            <a:effectRef idx="0">
-              <a:schemeClr val="accent1"/>
-            </a:effectRef>
-            <a:fontRef idx="minor">
-              <a:schemeClr val="tx1"/>
-            </a:fontRef>
-          </p:style>
-        </p:cxnSp>
-        <p:sp>
-          <p:nvSpPr>
-            <p:cNvPr id="15" name="TextBox 14">
-              <a:extLst>
-                <a:ext uri="{FF2B5EF4-FFF2-40B4-BE49-F238E27FC236}">
-                  <a16:creationId xmlns:a16="http://schemas.microsoft.com/office/drawing/2014/main" id="{04C41FC8-B976-0041-BC58-1E4EFB47EB9F}"/>
-                </a:ext>
-              </a:extLst>
-            </p:cNvPr>
-            <p:cNvSpPr txBox="1"/>
-            <p:nvPr/>
-          </p:nvSpPr>
-          <p:spPr>
-            <a:xfrm>
-              <a:off x="8622321" y="4370020"/>
-              <a:ext cx="914400" cy="369332"/>
-            </a:xfrm>
-            <a:prstGeom prst="rect">
-              <a:avLst/>
-            </a:prstGeom>
-            <a:noFill/>
-          </p:spPr>
-          <p:txBody>
-            <a:bodyPr wrap="square" rtlCol="0">
-              <a:spAutoFit/>
-            </a:bodyPr>
-            <a:lstStyle/>
-            <a:p>
-              <a:r>
-                <a:rPr lang="en-US" dirty="0"/>
-                <a:t>http</a:t>
-              </a:r>
-            </a:p>
-          </p:txBody>
-        </p:sp>
-      </p:grpSp>
-      <p:sp>
-        <p:nvSpPr>
-          <p:cNvPr id="18" name="Rounded Rectangle 17">
-            <a:extLst>
-              <a:ext uri="{FF2B5EF4-FFF2-40B4-BE49-F238E27FC236}">
-                <a16:creationId xmlns:a16="http://schemas.microsoft.com/office/drawing/2014/main" id="{D4E854A3-70BB-D644-B0E2-8D12F5D60607}"/>
-              </a:ext>
-            </a:extLst>
-          </p:cNvPr>
-          <p:cNvSpPr/>
-          <p:nvPr/>
-        </p:nvSpPr>
-        <p:spPr>
-          <a:xfrm>
-            <a:off x="5193323" y="357293"/>
-            <a:ext cx="2309447" cy="1031631"/>
-          </a:xfrm>
-          <a:prstGeom prst="roundRect">
-            <a:avLst/>
-          </a:prstGeom>
-        </p:spPr>
-        <p:style>
-          <a:lnRef idx="2">
-            <a:schemeClr val="accent1">
-              <a:shade val="50000"/>
-            </a:schemeClr>
-          </a:lnRef>
-          <a:fillRef idx="1">
-            <a:schemeClr val="accent1"/>
-          </a:fillRef>
-          <a:effectRef idx="0">
-            <a:schemeClr val="accent1"/>
-          </a:effectRef>
-          <a:fontRef idx="minor">
-            <a:schemeClr val="lt1"/>
-          </a:fontRef>
-        </p:style>
-        <p:txBody>
-          <a:bodyPr rtlCol="0" anchor="ctr"/>
-          <a:lstStyle/>
-          <a:p>
-            <a:pPr algn="ctr"/>
-            <a:r>
-              <a:rPr lang="en-US" sz="2400" dirty="0"/>
-              <a:t>Kafka</a:t>
-            </a:r>
-          </a:p>
-        </p:txBody>
-      </p:sp>
-      <p:grpSp>
-        <p:nvGrpSpPr>
-          <p:cNvPr id="42" name="Group 41">
-            <a:extLst>
-              <a:ext uri="{FF2B5EF4-FFF2-40B4-BE49-F238E27FC236}">
-                <a16:creationId xmlns:a16="http://schemas.microsoft.com/office/drawing/2014/main" id="{DC942775-9BB6-CA41-A029-E6DECCAD8FEC}"/>
-              </a:ext>
-            </a:extLst>
-          </p:cNvPr>
-          <p:cNvGrpSpPr/>
-          <p:nvPr/>
-        </p:nvGrpSpPr>
-        <p:grpSpPr>
-          <a:xfrm>
-            <a:off x="2350480" y="2206436"/>
-            <a:ext cx="2743196" cy="2590800"/>
-            <a:chOff x="2198080" y="3241702"/>
-            <a:chExt cx="2743196" cy="2590800"/>
-          </a:xfrm>
-        </p:grpSpPr>
-        <p:sp>
-          <p:nvSpPr>
-            <p:cNvPr id="43" name="Rectangle 42">
-              <a:extLst>
-                <a:ext uri="{FF2B5EF4-FFF2-40B4-BE49-F238E27FC236}">
-                  <a16:creationId xmlns:a16="http://schemas.microsoft.com/office/drawing/2014/main" id="{2CF24FF8-026C-2F4B-9939-4A0332D8C89A}"/>
-                </a:ext>
-              </a:extLst>
-            </p:cNvPr>
-            <p:cNvSpPr/>
-            <p:nvPr/>
-          </p:nvSpPr>
-          <p:spPr>
-            <a:xfrm>
-              <a:off x="2198080" y="3241702"/>
-              <a:ext cx="2743196" cy="2590800"/>
-            </a:xfrm>
-            <a:prstGeom prst="rect">
-              <a:avLst/>
-            </a:prstGeom>
-            <a:solidFill>
-              <a:schemeClr val="accent2">
-                <a:lumMod val="40000"/>
-                <a:lumOff val="60000"/>
-              </a:schemeClr>
-            </a:solidFill>
-          </p:spPr>
-          <p:style>
-            <a:lnRef idx="2">
-              <a:schemeClr val="accent1">
-                <a:shade val="50000"/>
-              </a:schemeClr>
-            </a:lnRef>
-            <a:fillRef idx="1">
-              <a:schemeClr val="accent1"/>
-            </a:fillRef>
-            <a:effectRef idx="0">
-              <a:schemeClr val="accent1"/>
-            </a:effectRef>
-            <a:fontRef idx="minor">
-              <a:schemeClr val="lt1"/>
-            </a:fontRef>
-          </p:style>
-          <p:txBody>
-            <a:bodyPr rtlCol="0" anchor="ctr"/>
-            <a:lstStyle/>
-            <a:p>
-              <a:r>
-                <a:rPr lang="en-US" dirty="0">
-                  <a:solidFill>
-                    <a:schemeClr val="tx1"/>
-                  </a:solidFill>
-                </a:rPr>
-                <a:t>pod</a:t>
-              </a:r>
-            </a:p>
-            <a:p>
-              <a:pPr algn="ctr"/>
-              <a:endParaRPr lang="en-US" dirty="0">
-                <a:solidFill>
-                  <a:schemeClr val="tx1"/>
-                </a:solidFill>
-              </a:endParaRPr>
-            </a:p>
-            <a:p>
-              <a:pPr algn="ctr"/>
-              <a:endParaRPr lang="en-US" dirty="0">
-                <a:solidFill>
-                  <a:schemeClr val="tx1"/>
-                </a:solidFill>
-              </a:endParaRPr>
-            </a:p>
-            <a:p>
-              <a:pPr algn="ctr"/>
-              <a:endParaRPr lang="en-US" dirty="0">
-                <a:solidFill>
-                  <a:schemeClr val="tx1"/>
-                </a:solidFill>
-              </a:endParaRPr>
-            </a:p>
-            <a:p>
-              <a:pPr algn="ctr"/>
-              <a:endParaRPr lang="en-US" dirty="0">
-                <a:solidFill>
-                  <a:schemeClr val="tx1"/>
-                </a:solidFill>
-              </a:endParaRPr>
-            </a:p>
-            <a:p>
-              <a:pPr algn="ctr"/>
-              <a:endParaRPr lang="en-US" dirty="0">
-                <a:solidFill>
-                  <a:schemeClr val="tx1"/>
-                </a:solidFill>
-              </a:endParaRPr>
-            </a:p>
-            <a:p>
-              <a:pPr algn="ctr"/>
-              <a:endParaRPr lang="en-US" dirty="0">
-                <a:solidFill>
-                  <a:schemeClr val="tx1"/>
-                </a:solidFill>
-              </a:endParaRPr>
-            </a:p>
-            <a:p>
-              <a:pPr algn="ctr"/>
-              <a:endParaRPr lang="en-US" dirty="0">
-                <a:solidFill>
-                  <a:schemeClr val="tx1"/>
-                </a:solidFill>
-              </a:endParaRPr>
-            </a:p>
-            <a:p>
-              <a:pPr algn="ctr"/>
-              <a:endParaRPr lang="en-US" dirty="0">
-                <a:solidFill>
-                  <a:schemeClr val="tx1"/>
-                </a:solidFill>
-              </a:endParaRPr>
-            </a:p>
-          </p:txBody>
-        </p:sp>
-        <p:sp>
-          <p:nvSpPr>
-            <p:cNvPr id="44" name="TextBox 43">
-              <a:extLst>
-                <a:ext uri="{FF2B5EF4-FFF2-40B4-BE49-F238E27FC236}">
-                  <a16:creationId xmlns:a16="http://schemas.microsoft.com/office/drawing/2014/main" id="{0DC20C01-7179-1442-8996-4234ACDAAFCA}"/>
-                </a:ext>
-              </a:extLst>
-            </p:cNvPr>
-            <p:cNvSpPr txBox="1"/>
-            <p:nvPr/>
-          </p:nvSpPr>
-          <p:spPr>
-            <a:xfrm>
-              <a:off x="2526326" y="4884467"/>
-              <a:ext cx="2086707" cy="461665"/>
-            </a:xfrm>
-            <a:prstGeom prst="rect">
-              <a:avLst/>
-            </a:prstGeom>
-            <a:solidFill>
-              <a:srgbClr val="0070C0"/>
-            </a:solidFill>
-          </p:spPr>
-          <p:txBody>
-            <a:bodyPr wrap="square" rtlCol="0">
-              <a:spAutoFit/>
-            </a:bodyPr>
-            <a:lstStyle/>
-            <a:p>
-              <a:pPr algn="ctr"/>
-              <a:r>
-                <a:rPr lang="en-US" sz="2400" dirty="0">
-                  <a:solidFill>
-                    <a:schemeClr val="bg1"/>
-                  </a:solidFill>
-                </a:rPr>
-                <a:t>server</a:t>
-              </a:r>
-            </a:p>
-          </p:txBody>
-        </p:sp>
-        <p:sp>
-          <p:nvSpPr>
-            <p:cNvPr id="45" name="TextBox 44">
-              <a:extLst>
-                <a:ext uri="{FF2B5EF4-FFF2-40B4-BE49-F238E27FC236}">
-                  <a16:creationId xmlns:a16="http://schemas.microsoft.com/office/drawing/2014/main" id="{3223ADC3-ADB5-F744-A6DF-3D01F62E91F8}"/>
-                </a:ext>
-              </a:extLst>
-            </p:cNvPr>
-            <p:cNvSpPr txBox="1"/>
-            <p:nvPr/>
-          </p:nvSpPr>
-          <p:spPr>
-            <a:xfrm>
-              <a:off x="2526325" y="3728073"/>
-              <a:ext cx="2086707" cy="461665"/>
-            </a:xfrm>
-            <a:prstGeom prst="rect">
-              <a:avLst/>
-            </a:prstGeom>
-            <a:solidFill>
-              <a:srgbClr val="0070C0"/>
-            </a:solidFill>
-          </p:spPr>
-          <p:txBody>
-            <a:bodyPr wrap="square" rtlCol="0">
-              <a:spAutoFit/>
-            </a:bodyPr>
-            <a:lstStyle/>
-            <a:p>
-              <a:pPr algn="ctr"/>
-              <a:r>
-                <a:rPr lang="en-US" sz="2400" dirty="0">
-                  <a:solidFill>
-                    <a:schemeClr val="bg1"/>
-                  </a:solidFill>
-                </a:rPr>
-                <a:t>sidecar</a:t>
-              </a:r>
-            </a:p>
-          </p:txBody>
-        </p:sp>
-        <p:cxnSp>
-          <p:nvCxnSpPr>
-            <p:cNvPr id="46" name="Straight Arrow Connector 45">
-              <a:extLst>
-                <a:ext uri="{FF2B5EF4-FFF2-40B4-BE49-F238E27FC236}">
-                  <a16:creationId xmlns:a16="http://schemas.microsoft.com/office/drawing/2014/main" id="{729BE499-DD58-014B-A4D5-EDC018FF7077}"/>
-                </a:ext>
-              </a:extLst>
-            </p:cNvPr>
-            <p:cNvCxnSpPr>
-              <a:cxnSpLocks/>
-              <a:stCxn id="45" idx="2"/>
-              <a:endCxn id="44" idx="0"/>
-            </p:cNvCxnSpPr>
-            <p:nvPr/>
-          </p:nvCxnSpPr>
-          <p:spPr>
-            <a:xfrm>
-              <a:off x="3569679" y="4189738"/>
-              <a:ext cx="1" cy="694729"/>
-            </a:xfrm>
-            <a:prstGeom prst="straightConnector1">
-              <a:avLst/>
-            </a:prstGeom>
-            <a:ln w="38100">
-              <a:headEnd type="triangle"/>
-              <a:tailEnd type="triangle"/>
-            </a:ln>
-          </p:spPr>
-          <p:style>
-            <a:lnRef idx="1">
-              <a:schemeClr val="accent1"/>
-            </a:lnRef>
-            <a:fillRef idx="0">
-              <a:schemeClr val="accent1"/>
-            </a:fillRef>
-            <a:effectRef idx="0">
-              <a:schemeClr val="accent1"/>
-            </a:effectRef>
-            <a:fontRef idx="minor">
-              <a:schemeClr val="tx1"/>
-            </a:fontRef>
-          </p:style>
-        </p:cxnSp>
-        <p:sp>
-          <p:nvSpPr>
-            <p:cNvPr id="47" name="TextBox 46">
-              <a:extLst>
-                <a:ext uri="{FF2B5EF4-FFF2-40B4-BE49-F238E27FC236}">
-                  <a16:creationId xmlns:a16="http://schemas.microsoft.com/office/drawing/2014/main" id="{159C2211-6729-7F42-AEC4-799CACA59D70}"/>
-                </a:ext>
-              </a:extLst>
-            </p:cNvPr>
-            <p:cNvSpPr txBox="1"/>
-            <p:nvPr/>
-          </p:nvSpPr>
-          <p:spPr>
-            <a:xfrm>
-              <a:off x="3569678" y="4365692"/>
-              <a:ext cx="914400" cy="369332"/>
-            </a:xfrm>
-            <a:prstGeom prst="rect">
-              <a:avLst/>
-            </a:prstGeom>
-            <a:noFill/>
-          </p:spPr>
-          <p:txBody>
-            <a:bodyPr wrap="square" rtlCol="0">
-              <a:spAutoFit/>
-            </a:bodyPr>
-            <a:lstStyle/>
-            <a:p>
-              <a:r>
-                <a:rPr lang="en-US" dirty="0"/>
-                <a:t>http</a:t>
-              </a:r>
-            </a:p>
-          </p:txBody>
-        </p:sp>
-      </p:grpSp>
-      <p:grpSp>
-        <p:nvGrpSpPr>
-          <p:cNvPr id="48" name="Group 47">
-            <a:extLst>
-              <a:ext uri="{FF2B5EF4-FFF2-40B4-BE49-F238E27FC236}">
-                <a16:creationId xmlns:a16="http://schemas.microsoft.com/office/drawing/2014/main" id="{93BBD36D-361F-9640-9A84-6C175F7AE521}"/>
-              </a:ext>
-            </a:extLst>
-          </p:cNvPr>
-          <p:cNvGrpSpPr/>
-          <p:nvPr/>
-        </p:nvGrpSpPr>
-        <p:grpSpPr>
-          <a:xfrm>
-            <a:off x="2502880" y="2358836"/>
-            <a:ext cx="2743196" cy="2590800"/>
-            <a:chOff x="2198080" y="3241702"/>
-            <a:chExt cx="2743196" cy="2590800"/>
-          </a:xfrm>
-        </p:grpSpPr>
-        <p:sp>
-          <p:nvSpPr>
-            <p:cNvPr id="49" name="Rectangle 48">
-              <a:extLst>
-                <a:ext uri="{FF2B5EF4-FFF2-40B4-BE49-F238E27FC236}">
-                  <a16:creationId xmlns:a16="http://schemas.microsoft.com/office/drawing/2014/main" id="{7271FDF0-B59A-BE44-9C45-9B8ECA04537E}"/>
-                </a:ext>
-              </a:extLst>
-            </p:cNvPr>
-            <p:cNvSpPr/>
-            <p:nvPr/>
-          </p:nvSpPr>
-          <p:spPr>
-            <a:xfrm>
-              <a:off x="2198080" y="3241702"/>
-              <a:ext cx="2743196" cy="2590800"/>
-            </a:xfrm>
-            <a:prstGeom prst="rect">
-              <a:avLst/>
-            </a:prstGeom>
-            <a:solidFill>
-              <a:schemeClr val="accent2">
-                <a:lumMod val="40000"/>
-                <a:lumOff val="60000"/>
-              </a:schemeClr>
-            </a:solidFill>
-          </p:spPr>
-          <p:style>
-            <a:lnRef idx="2">
-              <a:schemeClr val="accent1">
-                <a:shade val="50000"/>
-              </a:schemeClr>
-            </a:lnRef>
-            <a:fillRef idx="1">
-              <a:schemeClr val="accent1"/>
-            </a:fillRef>
-            <a:effectRef idx="0">
-              <a:schemeClr val="accent1"/>
-            </a:effectRef>
-            <a:fontRef idx="minor">
-              <a:schemeClr val="lt1"/>
-            </a:fontRef>
-          </p:style>
-          <p:txBody>
-            <a:bodyPr rtlCol="0" anchor="ctr"/>
-            <a:lstStyle/>
-            <a:p>
-              <a:r>
-                <a:rPr lang="en-US" dirty="0">
-                  <a:solidFill>
-                    <a:schemeClr val="tx1"/>
-                  </a:solidFill>
-                </a:rPr>
-                <a:t>pod</a:t>
-              </a:r>
-            </a:p>
-            <a:p>
-              <a:pPr algn="ctr"/>
-              <a:endParaRPr lang="en-US" dirty="0">
-                <a:solidFill>
-                  <a:schemeClr val="tx1"/>
-                </a:solidFill>
-              </a:endParaRPr>
-            </a:p>
-            <a:p>
-              <a:pPr algn="ctr"/>
-              <a:endParaRPr lang="en-US" dirty="0">
-                <a:solidFill>
-                  <a:schemeClr val="tx1"/>
-                </a:solidFill>
-              </a:endParaRPr>
-            </a:p>
-            <a:p>
-              <a:pPr algn="ctr"/>
-              <a:endParaRPr lang="en-US" dirty="0">
-                <a:solidFill>
-                  <a:schemeClr val="tx1"/>
-                </a:solidFill>
-              </a:endParaRPr>
-            </a:p>
-            <a:p>
-              <a:pPr algn="ctr"/>
-              <a:endParaRPr lang="en-US" dirty="0">
-                <a:solidFill>
-                  <a:schemeClr val="tx1"/>
-                </a:solidFill>
-              </a:endParaRPr>
-            </a:p>
-            <a:p>
-              <a:pPr algn="ctr"/>
-              <a:endParaRPr lang="en-US" dirty="0">
-                <a:solidFill>
-                  <a:schemeClr val="tx1"/>
-                </a:solidFill>
-              </a:endParaRPr>
-            </a:p>
-            <a:p>
-              <a:pPr algn="ctr"/>
-              <a:endParaRPr lang="en-US" dirty="0">
-                <a:solidFill>
-                  <a:schemeClr val="tx1"/>
-                </a:solidFill>
-              </a:endParaRPr>
-            </a:p>
-            <a:p>
-              <a:pPr algn="ctr"/>
-              <a:endParaRPr lang="en-US" dirty="0">
-                <a:solidFill>
-                  <a:schemeClr val="tx1"/>
-                </a:solidFill>
-              </a:endParaRPr>
-            </a:p>
-            <a:p>
-              <a:pPr algn="ctr"/>
-              <a:endParaRPr lang="en-US" dirty="0">
-                <a:solidFill>
-                  <a:schemeClr val="tx1"/>
-                </a:solidFill>
-              </a:endParaRPr>
-            </a:p>
-          </p:txBody>
-        </p:sp>
-        <p:sp>
-          <p:nvSpPr>
-            <p:cNvPr id="50" name="TextBox 49">
-              <a:extLst>
-                <a:ext uri="{FF2B5EF4-FFF2-40B4-BE49-F238E27FC236}">
-                  <a16:creationId xmlns:a16="http://schemas.microsoft.com/office/drawing/2014/main" id="{3DCCF9A3-AA0E-194C-AC93-432CFE41AFC9}"/>
-                </a:ext>
-              </a:extLst>
-            </p:cNvPr>
-            <p:cNvSpPr txBox="1"/>
-            <p:nvPr/>
-          </p:nvSpPr>
-          <p:spPr>
-            <a:xfrm>
-              <a:off x="2526326" y="4884467"/>
-              <a:ext cx="2086707" cy="461665"/>
-            </a:xfrm>
-            <a:prstGeom prst="rect">
-              <a:avLst/>
-            </a:prstGeom>
-            <a:solidFill>
-              <a:srgbClr val="0070C0"/>
-            </a:solidFill>
-          </p:spPr>
-          <p:txBody>
-            <a:bodyPr wrap="square" rtlCol="0">
-              <a:spAutoFit/>
-            </a:bodyPr>
-            <a:lstStyle/>
-            <a:p>
-              <a:pPr algn="ctr"/>
-              <a:r>
-                <a:rPr lang="en-US" sz="2400" dirty="0">
-                  <a:solidFill>
-                    <a:schemeClr val="bg1"/>
-                  </a:solidFill>
-                </a:rPr>
-                <a:t>App Comp. A</a:t>
-              </a:r>
-            </a:p>
-          </p:txBody>
-        </p:sp>
-        <p:sp>
-          <p:nvSpPr>
-            <p:cNvPr id="51" name="TextBox 50">
-              <a:extLst>
-                <a:ext uri="{FF2B5EF4-FFF2-40B4-BE49-F238E27FC236}">
-                  <a16:creationId xmlns:a16="http://schemas.microsoft.com/office/drawing/2014/main" id="{7013DF50-956D-C244-BAAC-E043039CF135}"/>
-                </a:ext>
-              </a:extLst>
-            </p:cNvPr>
-            <p:cNvSpPr txBox="1"/>
-            <p:nvPr/>
-          </p:nvSpPr>
-          <p:spPr>
-            <a:xfrm>
-              <a:off x="2526325" y="3728073"/>
-              <a:ext cx="2086707" cy="400110"/>
-            </a:xfrm>
-            <a:prstGeom prst="rect">
-              <a:avLst/>
-            </a:prstGeom>
-            <a:solidFill>
-              <a:srgbClr val="0070C0"/>
-            </a:solidFill>
-          </p:spPr>
-          <p:txBody>
-            <a:bodyPr wrap="square" rtlCol="0">
-              <a:spAutoFit/>
-            </a:bodyPr>
-            <a:lstStyle/>
-            <a:p>
-              <a:pPr algn="ctr"/>
-              <a:r>
-                <a:rPr lang="en-US" sz="2000" dirty="0">
-                  <a:solidFill>
-                    <a:schemeClr val="bg1"/>
-                  </a:solidFill>
-                </a:rPr>
-                <a:t>KAR sidecar</a:t>
-              </a:r>
-            </a:p>
-          </p:txBody>
-        </p:sp>
-        <p:cxnSp>
-          <p:nvCxnSpPr>
-            <p:cNvPr id="52" name="Straight Arrow Connector 51">
-              <a:extLst>
-                <a:ext uri="{FF2B5EF4-FFF2-40B4-BE49-F238E27FC236}">
-                  <a16:creationId xmlns:a16="http://schemas.microsoft.com/office/drawing/2014/main" id="{1ADC2670-884D-D24D-B16C-081AA05054A9}"/>
-                </a:ext>
-              </a:extLst>
-            </p:cNvPr>
-            <p:cNvCxnSpPr>
-              <a:cxnSpLocks/>
-              <a:stCxn id="51" idx="2"/>
-              <a:endCxn id="50" idx="0"/>
-            </p:cNvCxnSpPr>
-            <p:nvPr/>
-          </p:nvCxnSpPr>
-          <p:spPr>
-            <a:xfrm>
-              <a:off x="3569679" y="4128183"/>
-              <a:ext cx="1" cy="756284"/>
-            </a:xfrm>
-            <a:prstGeom prst="straightConnector1">
-              <a:avLst/>
-            </a:prstGeom>
-            <a:ln w="38100">
-              <a:headEnd type="triangle"/>
-              <a:tailEnd type="triangle"/>
-            </a:ln>
-          </p:spPr>
-          <p:style>
-            <a:lnRef idx="1">
-              <a:schemeClr val="accent1"/>
-            </a:lnRef>
-            <a:fillRef idx="0">
-              <a:schemeClr val="accent1"/>
-            </a:fillRef>
-            <a:effectRef idx="0">
-              <a:schemeClr val="accent1"/>
-            </a:effectRef>
-            <a:fontRef idx="minor">
-              <a:schemeClr val="tx1"/>
-            </a:fontRef>
-          </p:style>
-        </p:cxnSp>
-        <p:sp>
-          <p:nvSpPr>
-            <p:cNvPr id="53" name="TextBox 52">
-              <a:extLst>
-                <a:ext uri="{FF2B5EF4-FFF2-40B4-BE49-F238E27FC236}">
-                  <a16:creationId xmlns:a16="http://schemas.microsoft.com/office/drawing/2014/main" id="{0D06758F-3BDA-8C4E-8F31-E9EE9C084D19}"/>
-                </a:ext>
-              </a:extLst>
-            </p:cNvPr>
-            <p:cNvSpPr txBox="1"/>
-            <p:nvPr/>
-          </p:nvSpPr>
-          <p:spPr>
-            <a:xfrm>
-              <a:off x="3569678" y="4365692"/>
-              <a:ext cx="914400" cy="369332"/>
-            </a:xfrm>
-            <a:prstGeom prst="rect">
-              <a:avLst/>
-            </a:prstGeom>
-            <a:noFill/>
-          </p:spPr>
-          <p:txBody>
-            <a:bodyPr wrap="square" rtlCol="0">
-              <a:spAutoFit/>
-            </a:bodyPr>
-            <a:lstStyle/>
-            <a:p>
-              <a:r>
-                <a:rPr lang="en-US" dirty="0"/>
-                <a:t>http</a:t>
-              </a:r>
-            </a:p>
-          </p:txBody>
-        </p:sp>
-      </p:grpSp>
       <p:grpSp>
         <p:nvGrpSpPr>
           <p:cNvPr id="56" name="Group 55">
@@ -6029,7 +6205,7 @@
               <a:avLst/>
             </a:prstGeom>
             <a:solidFill>
-              <a:srgbClr val="0070C0"/>
+              <a:schemeClr val="accent6"/>
             </a:solidFill>
           </p:spPr>
           <p:txBody>

</xml_diff>